<commit_message>
small chANGES AND PPT SLIDES
</commit_message>
<xml_diff>
--- a/Presentation/Module06-Monitoring.pptx
+++ b/Presentation/Module06-Monitoring.pptx
@@ -254,10 +254,6 @@
     </p:extLst>
   </p:cmAuthor>
 </p:cmAuthorLst>
-</file>
-
-<file path=ppt/revisionInfo.xml><?xml version="1.0" encoding="utf-8"?>
-<p1510:revInfo xmlns:a="http://schemas.openxmlformats.org/drawingml/2006/main" xmlns:r="http://schemas.openxmlformats.org/officeDocument/2006/relationships" xmlns:p1510="http://schemas.microsoft.com/office/powerpoint/2015/10/main"/>
 </file>
 
 <file path=ppt/diagrams/colors1.xml><?xml version="1.0" encoding="utf-8"?>
@@ -2775,13 +2771,6 @@
         </dgm:presLayoutVars>
       </dgm:prSet>
       <dgm:spPr/>
-      <dgm:t>
-        <a:bodyPr/>
-        <a:lstStyle/>
-        <a:p>
-          <a:endParaRPr lang="en-US"/>
-        </a:p>
-      </dgm:t>
     </dgm:pt>
     <dgm:pt modelId="{8E126CA1-6C84-4C33-B311-61E786FFB8A4}" type="pres">
       <dgm:prSet presAssocID="{2CEF2A7D-F5B7-45CE-AD61-6BADCC72FB4A}" presName="node" presStyleLbl="node1" presStyleIdx="0" presStyleCnt="7">
@@ -2790,13 +2779,6 @@
         </dgm:presLayoutVars>
       </dgm:prSet>
       <dgm:spPr/>
-      <dgm:t>
-        <a:bodyPr/>
-        <a:lstStyle/>
-        <a:p>
-          <a:endParaRPr lang="en-US"/>
-        </a:p>
-      </dgm:t>
     </dgm:pt>
     <dgm:pt modelId="{BA3CB576-905D-4BE5-8019-13421F3D917B}" type="pres">
       <dgm:prSet presAssocID="{1FE3CEC9-FF31-42CF-BE9E-4E0DD3B7A820}" presName="sibTrans" presStyleCnt="0"/>
@@ -2809,13 +2791,6 @@
         </dgm:presLayoutVars>
       </dgm:prSet>
       <dgm:spPr/>
-      <dgm:t>
-        <a:bodyPr/>
-        <a:lstStyle/>
-        <a:p>
-          <a:endParaRPr lang="en-US"/>
-        </a:p>
-      </dgm:t>
     </dgm:pt>
     <dgm:pt modelId="{888A1AC5-BE33-4FFA-B319-21B63A7E34D3}" type="pres">
       <dgm:prSet presAssocID="{E2651BE6-BF37-4F8F-ABA5-43A01574E577}" presName="sibTrans" presStyleCnt="0"/>
@@ -2828,13 +2803,6 @@
         </dgm:presLayoutVars>
       </dgm:prSet>
       <dgm:spPr/>
-      <dgm:t>
-        <a:bodyPr/>
-        <a:lstStyle/>
-        <a:p>
-          <a:endParaRPr lang="en-US"/>
-        </a:p>
-      </dgm:t>
     </dgm:pt>
     <dgm:pt modelId="{EDF7F60C-8E83-4E77-B4AA-2A52EEA73046}" type="pres">
       <dgm:prSet presAssocID="{9F4B5A59-33A9-4655-8E94-F6F88B34972D}" presName="sibTrans" presStyleCnt="0"/>
@@ -2847,13 +2815,6 @@
         </dgm:presLayoutVars>
       </dgm:prSet>
       <dgm:spPr/>
-      <dgm:t>
-        <a:bodyPr/>
-        <a:lstStyle/>
-        <a:p>
-          <a:endParaRPr lang="en-US"/>
-        </a:p>
-      </dgm:t>
     </dgm:pt>
     <dgm:pt modelId="{06B67C6E-3178-4A40-A480-ECDB443FC6A5}" type="pres">
       <dgm:prSet presAssocID="{2061AB9A-8745-4F26-9C3C-B0E9E976C094}" presName="sibTrans" presStyleCnt="0"/>
@@ -2866,13 +2827,6 @@
         </dgm:presLayoutVars>
       </dgm:prSet>
       <dgm:spPr/>
-      <dgm:t>
-        <a:bodyPr/>
-        <a:lstStyle/>
-        <a:p>
-          <a:endParaRPr lang="en-US"/>
-        </a:p>
-      </dgm:t>
     </dgm:pt>
     <dgm:pt modelId="{FBE8E362-3906-43E8-936A-8FE6BA041CE9}" type="pres">
       <dgm:prSet presAssocID="{740CBEA5-01E8-49CD-A93D-1B25C85F8209}" presName="sibTrans" presStyleCnt="0"/>
@@ -2885,13 +2839,6 @@
         </dgm:presLayoutVars>
       </dgm:prSet>
       <dgm:spPr/>
-      <dgm:t>
-        <a:bodyPr/>
-        <a:lstStyle/>
-        <a:p>
-          <a:endParaRPr lang="en-US"/>
-        </a:p>
-      </dgm:t>
     </dgm:pt>
     <dgm:pt modelId="{2903EB63-4F45-4F7C-BFDF-799F29EE742E}" type="pres">
       <dgm:prSet presAssocID="{58359EAE-9FF4-4231-A901-5CB84A7BE1C0}" presName="sibTrans" presStyleCnt="0"/>
@@ -2904,31 +2851,24 @@
         </dgm:presLayoutVars>
       </dgm:prSet>
       <dgm:spPr/>
-      <dgm:t>
-        <a:bodyPr/>
-        <a:lstStyle/>
-        <a:p>
-          <a:endParaRPr lang="en-US"/>
-        </a:p>
-      </dgm:t>
     </dgm:pt>
   </dgm:ptLst>
   <dgm:cxnLst>
+    <dgm:cxn modelId="{DE3B9609-74EF-49A9-B992-72931BC3214D}" type="presOf" srcId="{FAEFE885-368E-4563-A90E-0273DBE85B37}" destId="{183FEB11-51AC-4DEC-8CD1-C9F5DB88831F}" srcOrd="0" destOrd="0" presId="urn:microsoft.com/office/officeart/2005/8/layout/default"/>
+    <dgm:cxn modelId="{A9956A1F-25ED-43C1-B300-90145987B63D}" type="presOf" srcId="{61E4A2FF-7578-4A11-A3E8-CF08E852D1A8}" destId="{13B012BF-49BA-4F3D-A33C-FF0146C65D1B}" srcOrd="0" destOrd="0" presId="urn:microsoft.com/office/officeart/2005/8/layout/default"/>
+    <dgm:cxn modelId="{30ADE068-23BD-4CBB-AD38-CE921D5D5FF5}" type="presOf" srcId="{4675914B-2A7D-4DDA-8E2C-B7A8C5DCBB3C}" destId="{BC431EA5-02B2-4171-AFA4-408C2225DC07}" srcOrd="0" destOrd="0" presId="urn:microsoft.com/office/officeart/2005/8/layout/default"/>
+    <dgm:cxn modelId="{B94FC54F-A2B4-4B41-AA77-E58DD283C36D}" srcId="{4675914B-2A7D-4DDA-8E2C-B7A8C5DCBB3C}" destId="{2CEF2A7D-F5B7-45CE-AD61-6BADCC72FB4A}" srcOrd="0" destOrd="0" parTransId="{75BC48E3-3DEE-4A30-9747-46C52FC06BC0}" sibTransId="{1FE3CEC9-FF31-42CF-BE9E-4E0DD3B7A820}"/>
+    <dgm:cxn modelId="{7A5B1571-21E7-47B8-A3FB-3017F3E374A3}" type="presOf" srcId="{046909FC-9172-4E26-9428-57C41643B51F}" destId="{EA3FD69F-AAE5-472C-ACB2-68C47FFCAE24}" srcOrd="0" destOrd="0" presId="urn:microsoft.com/office/officeart/2005/8/layout/default"/>
+    <dgm:cxn modelId="{E2EE6A79-BB85-42D3-9E34-A91976D47266}" srcId="{4675914B-2A7D-4DDA-8E2C-B7A8C5DCBB3C}" destId="{046909FC-9172-4E26-9428-57C41643B51F}" srcOrd="3" destOrd="0" parTransId="{9C89AC08-65E9-4F0C-B2D6-355D68782ADC}" sibTransId="{2061AB9A-8745-4F26-9C3C-B0E9E976C094}"/>
+    <dgm:cxn modelId="{2E278C8D-41D0-43F0-BEE1-8BBC4D8A9F47}" srcId="{4675914B-2A7D-4DDA-8E2C-B7A8C5DCBB3C}" destId="{28B66A95-913A-4684-8339-15CC04E620C7}" srcOrd="4" destOrd="0" parTransId="{CE390AAB-653F-40D2-BAF7-69117FB1590A}" sibTransId="{740CBEA5-01E8-49CD-A93D-1B25C85F8209}"/>
+    <dgm:cxn modelId="{7C5BB38E-D64A-4690-A1CC-6643B2DCABEF}" type="presOf" srcId="{43BFCED6-55B8-4FBC-8753-EE300675FF69}" destId="{A722F6DC-48B9-4FA9-B87E-1CE11DDBA0C6}" srcOrd="0" destOrd="0" presId="urn:microsoft.com/office/officeart/2005/8/layout/default"/>
     <dgm:cxn modelId="{00070DAA-FA5B-4504-9F0B-89B6A9CE8BAA}" srcId="{4675914B-2A7D-4DDA-8E2C-B7A8C5DCBB3C}" destId="{D41BB831-EC62-4156-9A88-BBB92CCF862B}" srcOrd="1" destOrd="0" parTransId="{02C689E1-192B-4258-9B4D-41833AB1F757}" sibTransId="{E2651BE6-BF37-4F8F-ABA5-43A01574E577}"/>
+    <dgm:cxn modelId="{499AACC2-3429-4065-AE89-1D156119A411}" type="presOf" srcId="{2CEF2A7D-F5B7-45CE-AD61-6BADCC72FB4A}" destId="{8E126CA1-6C84-4C33-B311-61E786FFB8A4}" srcOrd="0" destOrd="0" presId="urn:microsoft.com/office/officeart/2005/8/layout/default"/>
+    <dgm:cxn modelId="{3AB044C4-A4E1-4D7D-B8AC-4392F21B0FF4}" srcId="{4675914B-2A7D-4DDA-8E2C-B7A8C5DCBB3C}" destId="{61E4A2FF-7578-4A11-A3E8-CF08E852D1A8}" srcOrd="5" destOrd="0" parTransId="{875220EC-6176-4005-8E0E-B2516B924041}" sibTransId="{58359EAE-9FF4-4231-A901-5CB84A7BE1C0}"/>
+    <dgm:cxn modelId="{4F83C1C9-5540-4D83-87C8-897B2E4F3B25}" type="presOf" srcId="{D41BB831-EC62-4156-9A88-BBB92CCF862B}" destId="{73CDCFA3-F53B-4D04-804B-BF26BC63BF98}" srcOrd="0" destOrd="0" presId="urn:microsoft.com/office/officeart/2005/8/layout/default"/>
+    <dgm:cxn modelId="{256E6BCF-E013-4291-8EE8-379209795D19}" srcId="{4675914B-2A7D-4DDA-8E2C-B7A8C5DCBB3C}" destId="{43BFCED6-55B8-4FBC-8753-EE300675FF69}" srcOrd="6" destOrd="0" parTransId="{1BFD9358-C0F3-4C42-9EEA-0CE582809223}" sibTransId="{CCD36C37-13D2-430C-8E02-3DB3277B4F3A}"/>
     <dgm:cxn modelId="{39AAC8DD-BA24-4E28-B84E-9E424BD036E8}" srcId="{4675914B-2A7D-4DDA-8E2C-B7A8C5DCBB3C}" destId="{FAEFE885-368E-4563-A90E-0273DBE85B37}" srcOrd="2" destOrd="0" parTransId="{8CA70C98-5D91-4603-92CD-D003CFF432FD}" sibTransId="{9F4B5A59-33A9-4655-8E94-F6F88B34972D}"/>
-    <dgm:cxn modelId="{30ADE068-23BD-4CBB-AD38-CE921D5D5FF5}" type="presOf" srcId="{4675914B-2A7D-4DDA-8E2C-B7A8C5DCBB3C}" destId="{BC431EA5-02B2-4171-AFA4-408C2225DC07}" srcOrd="0" destOrd="0" presId="urn:microsoft.com/office/officeart/2005/8/layout/default"/>
-    <dgm:cxn modelId="{256E6BCF-E013-4291-8EE8-379209795D19}" srcId="{4675914B-2A7D-4DDA-8E2C-B7A8C5DCBB3C}" destId="{43BFCED6-55B8-4FBC-8753-EE300675FF69}" srcOrd="6" destOrd="0" parTransId="{1BFD9358-C0F3-4C42-9EEA-0CE582809223}" sibTransId="{CCD36C37-13D2-430C-8E02-3DB3277B4F3A}"/>
-    <dgm:cxn modelId="{4F83C1C9-5540-4D83-87C8-897B2E4F3B25}" type="presOf" srcId="{D41BB831-EC62-4156-9A88-BBB92CCF862B}" destId="{73CDCFA3-F53B-4D04-804B-BF26BC63BF98}" srcOrd="0" destOrd="0" presId="urn:microsoft.com/office/officeart/2005/8/layout/default"/>
-    <dgm:cxn modelId="{A9956A1F-25ED-43C1-B300-90145987B63D}" type="presOf" srcId="{61E4A2FF-7578-4A11-A3E8-CF08E852D1A8}" destId="{13B012BF-49BA-4F3D-A33C-FF0146C65D1B}" srcOrd="0" destOrd="0" presId="urn:microsoft.com/office/officeart/2005/8/layout/default"/>
-    <dgm:cxn modelId="{499AACC2-3429-4065-AE89-1D156119A411}" type="presOf" srcId="{2CEF2A7D-F5B7-45CE-AD61-6BADCC72FB4A}" destId="{8E126CA1-6C84-4C33-B311-61E786FFB8A4}" srcOrd="0" destOrd="0" presId="urn:microsoft.com/office/officeart/2005/8/layout/default"/>
-    <dgm:cxn modelId="{7C5BB38E-D64A-4690-A1CC-6643B2DCABEF}" type="presOf" srcId="{43BFCED6-55B8-4FBC-8753-EE300675FF69}" destId="{A722F6DC-48B9-4FA9-B87E-1CE11DDBA0C6}" srcOrd="0" destOrd="0" presId="urn:microsoft.com/office/officeart/2005/8/layout/default"/>
-    <dgm:cxn modelId="{DE3B9609-74EF-49A9-B992-72931BC3214D}" type="presOf" srcId="{FAEFE885-368E-4563-A90E-0273DBE85B37}" destId="{183FEB11-51AC-4DEC-8CD1-C9F5DB88831F}" srcOrd="0" destOrd="0" presId="urn:microsoft.com/office/officeart/2005/8/layout/default"/>
-    <dgm:cxn modelId="{7A5B1571-21E7-47B8-A3FB-3017F3E374A3}" type="presOf" srcId="{046909FC-9172-4E26-9428-57C41643B51F}" destId="{EA3FD69F-AAE5-472C-ACB2-68C47FFCAE24}" srcOrd="0" destOrd="0" presId="urn:microsoft.com/office/officeart/2005/8/layout/default"/>
-    <dgm:cxn modelId="{B94FC54F-A2B4-4B41-AA77-E58DD283C36D}" srcId="{4675914B-2A7D-4DDA-8E2C-B7A8C5DCBB3C}" destId="{2CEF2A7D-F5B7-45CE-AD61-6BADCC72FB4A}" srcOrd="0" destOrd="0" parTransId="{75BC48E3-3DEE-4A30-9747-46C52FC06BC0}" sibTransId="{1FE3CEC9-FF31-42CF-BE9E-4E0DD3B7A820}"/>
-    <dgm:cxn modelId="{2E278C8D-41D0-43F0-BEE1-8BBC4D8A9F47}" srcId="{4675914B-2A7D-4DDA-8E2C-B7A8C5DCBB3C}" destId="{28B66A95-913A-4684-8339-15CC04E620C7}" srcOrd="4" destOrd="0" parTransId="{CE390AAB-653F-40D2-BAF7-69117FB1590A}" sibTransId="{740CBEA5-01E8-49CD-A93D-1B25C85F8209}"/>
     <dgm:cxn modelId="{2DE19CEE-1B23-4A09-884E-F2E9C656A8E7}" type="presOf" srcId="{28B66A95-913A-4684-8339-15CC04E620C7}" destId="{255BA920-6CA2-42C2-A1AB-87187F19475C}" srcOrd="0" destOrd="0" presId="urn:microsoft.com/office/officeart/2005/8/layout/default"/>
-    <dgm:cxn modelId="{3AB044C4-A4E1-4D7D-B8AC-4392F21B0FF4}" srcId="{4675914B-2A7D-4DDA-8E2C-B7A8C5DCBB3C}" destId="{61E4A2FF-7578-4A11-A3E8-CF08E852D1A8}" srcOrd="5" destOrd="0" parTransId="{875220EC-6176-4005-8E0E-B2516B924041}" sibTransId="{58359EAE-9FF4-4231-A901-5CB84A7BE1C0}"/>
-    <dgm:cxn modelId="{E2EE6A79-BB85-42D3-9E34-A91976D47266}" srcId="{4675914B-2A7D-4DDA-8E2C-B7A8C5DCBB3C}" destId="{046909FC-9172-4E26-9428-57C41643B51F}" srcOrd="3" destOrd="0" parTransId="{9C89AC08-65E9-4F0C-B2D6-355D68782ADC}" sibTransId="{2061AB9A-8745-4F26-9C3C-B0E9E976C094}"/>
     <dgm:cxn modelId="{97A90DF1-EB6F-476E-9457-C90DCD47F91C}" type="presParOf" srcId="{BC431EA5-02B2-4171-AFA4-408C2225DC07}" destId="{8E126CA1-6C84-4C33-B311-61E786FFB8A4}" srcOrd="0" destOrd="0" presId="urn:microsoft.com/office/officeart/2005/8/layout/default"/>
     <dgm:cxn modelId="{E2450B5F-8A28-454D-B7C8-84283FDF61BC}" type="presParOf" srcId="{BC431EA5-02B2-4171-AFA4-408C2225DC07}" destId="{BA3CB576-905D-4BE5-8019-13421F3D917B}" srcOrd="1" destOrd="0" presId="urn:microsoft.com/office/officeart/2005/8/layout/default"/>
     <dgm:cxn modelId="{60BE22AB-E503-4CB1-BC33-9688462354DB}" type="presParOf" srcId="{BC431EA5-02B2-4171-AFA4-408C2225DC07}" destId="{73CDCFA3-F53B-4D04-804B-BF26BC63BF98}" srcOrd="2" destOrd="0" presId="urn:microsoft.com/office/officeart/2005/8/layout/default"/>
@@ -3155,13 +3095,6 @@
         </dgm:presLayoutVars>
       </dgm:prSet>
       <dgm:spPr/>
-      <dgm:t>
-        <a:bodyPr/>
-        <a:lstStyle/>
-        <a:p>
-          <a:endParaRPr lang="en-US"/>
-        </a:p>
-      </dgm:t>
     </dgm:pt>
     <dgm:pt modelId="{7A209DD1-822D-4E90-ADC3-AB80E7CBB714}" type="pres">
       <dgm:prSet presAssocID="{8C1C97BB-D88D-4A00-AA1C-FF793DEE6ACF}" presName="node" presStyleLbl="node1" presStyleIdx="0" presStyleCnt="5">
@@ -3170,13 +3103,6 @@
         </dgm:presLayoutVars>
       </dgm:prSet>
       <dgm:spPr/>
-      <dgm:t>
-        <a:bodyPr/>
-        <a:lstStyle/>
-        <a:p>
-          <a:endParaRPr lang="en-US"/>
-        </a:p>
-      </dgm:t>
     </dgm:pt>
     <dgm:pt modelId="{67121270-6D0A-486B-A7BD-64D09E59F768}" type="pres">
       <dgm:prSet presAssocID="{BC4B3EEE-F139-4363-88D4-13161B6492B9}" presName="sibTrans" presStyleCnt="0"/>
@@ -3189,13 +3115,6 @@
         </dgm:presLayoutVars>
       </dgm:prSet>
       <dgm:spPr/>
-      <dgm:t>
-        <a:bodyPr/>
-        <a:lstStyle/>
-        <a:p>
-          <a:endParaRPr lang="en-US"/>
-        </a:p>
-      </dgm:t>
     </dgm:pt>
     <dgm:pt modelId="{142DAD51-AD41-48D0-8FF8-E436F4682A95}" type="pres">
       <dgm:prSet presAssocID="{89BDA597-29DC-415B-9A29-78C4B0745FC9}" presName="sibTrans" presStyleCnt="0"/>
@@ -3208,13 +3127,6 @@
         </dgm:presLayoutVars>
       </dgm:prSet>
       <dgm:spPr/>
-      <dgm:t>
-        <a:bodyPr/>
-        <a:lstStyle/>
-        <a:p>
-          <a:endParaRPr lang="en-US"/>
-        </a:p>
-      </dgm:t>
     </dgm:pt>
     <dgm:pt modelId="{636530AA-634A-4628-B3AA-D06F6AF74C63}" type="pres">
       <dgm:prSet presAssocID="{AE2B697B-025A-4FDA-B406-50D37D9474A1}" presName="sibTrans" presStyleCnt="0"/>
@@ -3227,13 +3139,6 @@
         </dgm:presLayoutVars>
       </dgm:prSet>
       <dgm:spPr/>
-      <dgm:t>
-        <a:bodyPr/>
-        <a:lstStyle/>
-        <a:p>
-          <a:endParaRPr lang="en-US"/>
-        </a:p>
-      </dgm:t>
     </dgm:pt>
     <dgm:pt modelId="{6A87F109-8599-4526-B6F7-2D24D4B56C79}" type="pres">
       <dgm:prSet presAssocID="{5831EA89-5574-4AC2-BA49-3C97F2F5D501}" presName="sibTrans" presStyleCnt="0"/>
@@ -3246,27 +3151,20 @@
         </dgm:presLayoutVars>
       </dgm:prSet>
       <dgm:spPr/>
-      <dgm:t>
-        <a:bodyPr/>
-        <a:lstStyle/>
-        <a:p>
-          <a:endParaRPr lang="en-US"/>
-        </a:p>
-      </dgm:t>
     </dgm:pt>
   </dgm:ptLst>
   <dgm:cxnLst>
+    <dgm:cxn modelId="{E4E3CA0C-C125-4054-A0D8-053CF085A790}" type="presOf" srcId="{C688F4F3-2DEC-4216-BE7C-7C55BD5F1B93}" destId="{8FA97C2C-94BC-49AB-9F2E-04441510791D}" srcOrd="0" destOrd="0" presId="urn:microsoft.com/office/officeart/2005/8/layout/default"/>
+    <dgm:cxn modelId="{72DFB43E-5062-4689-A89E-BED3DB219851}" type="presOf" srcId="{8C1C97BB-D88D-4A00-AA1C-FF793DEE6ACF}" destId="{7A209DD1-822D-4E90-ADC3-AB80E7CBB714}" srcOrd="0" destOrd="0" presId="urn:microsoft.com/office/officeart/2005/8/layout/default"/>
+    <dgm:cxn modelId="{982AE760-6E7E-4006-9D69-3E333D3A83EB}" type="presOf" srcId="{7E899087-A012-4CAD-ABF0-AC256EDDF72E}" destId="{448BC1B6-3B77-43B1-8317-1ECDF4C16EBB}" srcOrd="0" destOrd="0" presId="urn:microsoft.com/office/officeart/2005/8/layout/default"/>
     <dgm:cxn modelId="{FBE43A62-2C5F-473F-AE8B-7A1E980ADE9C}" type="presOf" srcId="{325E2D48-CB40-4C8F-96B6-51BB0A38C639}" destId="{06CBEE87-7132-49C1-8197-522C3D77FA29}" srcOrd="0" destOrd="0" presId="urn:microsoft.com/office/officeart/2005/8/layout/default"/>
-    <dgm:cxn modelId="{982AE760-6E7E-4006-9D69-3E333D3A83EB}" type="presOf" srcId="{7E899087-A012-4CAD-ABF0-AC256EDDF72E}" destId="{448BC1B6-3B77-43B1-8317-1ECDF4C16EBB}" srcOrd="0" destOrd="0" presId="urn:microsoft.com/office/officeart/2005/8/layout/default"/>
     <dgm:cxn modelId="{C594BA7C-9020-401C-8B83-14128674E5E6}" srcId="{325E2D48-CB40-4C8F-96B6-51BB0A38C639}" destId="{8C1C97BB-D88D-4A00-AA1C-FF793DEE6ACF}" srcOrd="0" destOrd="0" parTransId="{475BED29-8619-491C-A6E7-4DF657F28841}" sibTransId="{BC4B3EEE-F139-4363-88D4-13161B6492B9}"/>
-    <dgm:cxn modelId="{72DFB43E-5062-4689-A89E-BED3DB219851}" type="presOf" srcId="{8C1C97BB-D88D-4A00-AA1C-FF793DEE6ACF}" destId="{7A209DD1-822D-4E90-ADC3-AB80E7CBB714}" srcOrd="0" destOrd="0" presId="urn:microsoft.com/office/officeart/2005/8/layout/default"/>
-    <dgm:cxn modelId="{70922CE3-5F7A-4F90-B607-20999F186604}" srcId="{325E2D48-CB40-4C8F-96B6-51BB0A38C639}" destId="{D7017EE2-F306-4471-9048-BB7E0B47C53A}" srcOrd="2" destOrd="0" parTransId="{AF9302C3-D0DF-4FAE-92B4-4CEDB58B502E}" sibTransId="{AE2B697B-025A-4FDA-B406-50D37D9474A1}"/>
+    <dgm:cxn modelId="{0C989884-E7B7-45CB-A7E3-3BA964AAF5CA}" type="presOf" srcId="{D7017EE2-F306-4471-9048-BB7E0B47C53A}" destId="{60ED6D07-FF23-45C3-A5E4-A5852688545E}" srcOrd="0" destOrd="0" presId="urn:microsoft.com/office/officeart/2005/8/layout/default"/>
+    <dgm:cxn modelId="{550EEAA8-B86A-4BCE-BA86-74DC192772A2}" srcId="{325E2D48-CB40-4C8F-96B6-51BB0A38C639}" destId="{6A7814D5-2425-45A9-AA23-A2FD1722B0BF}" srcOrd="3" destOrd="0" parTransId="{B318FD75-294B-4F68-92EF-2A59E39105ED}" sibTransId="{5831EA89-5574-4AC2-BA49-3C97F2F5D501}"/>
     <dgm:cxn modelId="{4ACBE7AF-B2BA-4444-B662-93D2F3AEDE51}" srcId="{325E2D48-CB40-4C8F-96B6-51BB0A38C639}" destId="{C688F4F3-2DEC-4216-BE7C-7C55BD5F1B93}" srcOrd="4" destOrd="0" parTransId="{19C87FA5-D3B8-4F8A-AB23-F08ED81DEF61}" sibTransId="{3DA3EDF6-238D-4384-9AC8-9FDA7FDFE927}"/>
     <dgm:cxn modelId="{A37C7CDC-FD1D-47FA-BA09-811B28772DD9}" srcId="{325E2D48-CB40-4C8F-96B6-51BB0A38C639}" destId="{7E899087-A012-4CAD-ABF0-AC256EDDF72E}" srcOrd="1" destOrd="0" parTransId="{E5FC4F50-D9C2-4FA5-9346-0D67182A121B}" sibTransId="{89BDA597-29DC-415B-9A29-78C4B0745FC9}"/>
-    <dgm:cxn modelId="{550EEAA8-B86A-4BCE-BA86-74DC192772A2}" srcId="{325E2D48-CB40-4C8F-96B6-51BB0A38C639}" destId="{6A7814D5-2425-45A9-AA23-A2FD1722B0BF}" srcOrd="3" destOrd="0" parTransId="{B318FD75-294B-4F68-92EF-2A59E39105ED}" sibTransId="{5831EA89-5574-4AC2-BA49-3C97F2F5D501}"/>
     <dgm:cxn modelId="{C4381FE3-2AA3-454B-933C-C3D29A908E82}" type="presOf" srcId="{6A7814D5-2425-45A9-AA23-A2FD1722B0BF}" destId="{E38988B0-CEF7-4A46-84A1-2140774E3AEB}" srcOrd="0" destOrd="0" presId="urn:microsoft.com/office/officeart/2005/8/layout/default"/>
-    <dgm:cxn modelId="{E4E3CA0C-C125-4054-A0D8-053CF085A790}" type="presOf" srcId="{C688F4F3-2DEC-4216-BE7C-7C55BD5F1B93}" destId="{8FA97C2C-94BC-49AB-9F2E-04441510791D}" srcOrd="0" destOrd="0" presId="urn:microsoft.com/office/officeart/2005/8/layout/default"/>
-    <dgm:cxn modelId="{0C989884-E7B7-45CB-A7E3-3BA964AAF5CA}" type="presOf" srcId="{D7017EE2-F306-4471-9048-BB7E0B47C53A}" destId="{60ED6D07-FF23-45C3-A5E4-A5852688545E}" srcOrd="0" destOrd="0" presId="urn:microsoft.com/office/officeart/2005/8/layout/default"/>
+    <dgm:cxn modelId="{70922CE3-5F7A-4F90-B607-20999F186604}" srcId="{325E2D48-CB40-4C8F-96B6-51BB0A38C639}" destId="{D7017EE2-F306-4471-9048-BB7E0B47C53A}" srcOrd="2" destOrd="0" parTransId="{AF9302C3-D0DF-4FAE-92B4-4CEDB58B502E}" sibTransId="{AE2B697B-025A-4FDA-B406-50D37D9474A1}"/>
     <dgm:cxn modelId="{EC9AD6D3-C939-4437-834C-6D8A498F6092}" type="presParOf" srcId="{06CBEE87-7132-49C1-8197-522C3D77FA29}" destId="{7A209DD1-822D-4E90-ADC3-AB80E7CBB714}" srcOrd="0" destOrd="0" presId="urn:microsoft.com/office/officeart/2005/8/layout/default"/>
     <dgm:cxn modelId="{918A1758-CEBC-43D1-9CD3-B2A4B800CEAA}" type="presParOf" srcId="{06CBEE87-7132-49C1-8197-522C3D77FA29}" destId="{67121270-6D0A-486B-A7BD-64D09E59F768}" srcOrd="1" destOrd="0" presId="urn:microsoft.com/office/officeart/2005/8/layout/default"/>
     <dgm:cxn modelId="{55B71008-6706-4D1C-8934-46C6D85A5FA3}" type="presParOf" srcId="{06CBEE87-7132-49C1-8197-522C3D77FA29}" destId="{448BC1B6-3B77-43B1-8317-1ECDF4C16EBB}" srcOrd="2" destOrd="0" presId="urn:microsoft.com/office/officeart/2005/8/layout/default"/>
@@ -3634,13 +3532,6 @@
         </dgm:presLayoutVars>
       </dgm:prSet>
       <dgm:spPr/>
-      <dgm:t>
-        <a:bodyPr/>
-        <a:lstStyle/>
-        <a:p>
-          <a:endParaRPr lang="en-US"/>
-        </a:p>
-      </dgm:t>
     </dgm:pt>
     <dgm:pt modelId="{CBBC936C-2FDE-42E7-9F0E-06687D3FCB78}" type="pres">
       <dgm:prSet presAssocID="{4A2B822F-7A5C-4F95-BD23-CB014DA30628}" presName="composite" presStyleCnt="0"/>
@@ -3655,13 +3546,6 @@
         </dgm:presLayoutVars>
       </dgm:prSet>
       <dgm:spPr/>
-      <dgm:t>
-        <a:bodyPr/>
-        <a:lstStyle/>
-        <a:p>
-          <a:endParaRPr lang="en-US"/>
-        </a:p>
-      </dgm:t>
     </dgm:pt>
     <dgm:pt modelId="{F31D1D09-68C4-4585-9C94-72B97514B72F}" type="pres">
       <dgm:prSet presAssocID="{4A2B822F-7A5C-4F95-BD23-CB014DA30628}" presName="desTx" presStyleLbl="alignAccFollowNode1" presStyleIdx="0" presStyleCnt="2">
@@ -3670,13 +3554,6 @@
         </dgm:presLayoutVars>
       </dgm:prSet>
       <dgm:spPr/>
-      <dgm:t>
-        <a:bodyPr/>
-        <a:lstStyle/>
-        <a:p>
-          <a:endParaRPr lang="en-US"/>
-        </a:p>
-      </dgm:t>
     </dgm:pt>
     <dgm:pt modelId="{2B44396C-79C3-4357-8A20-4B95E5F357AC}" type="pres">
       <dgm:prSet presAssocID="{BA601F54-B9C1-4E0E-9088-6FC1DB33DD70}" presName="space" presStyleCnt="0"/>
@@ -3695,13 +3572,6 @@
         </dgm:presLayoutVars>
       </dgm:prSet>
       <dgm:spPr/>
-      <dgm:t>
-        <a:bodyPr/>
-        <a:lstStyle/>
-        <a:p>
-          <a:endParaRPr lang="en-US"/>
-        </a:p>
-      </dgm:t>
     </dgm:pt>
     <dgm:pt modelId="{AF0C274F-C542-4795-AAF5-EAB834A68A14}" type="pres">
       <dgm:prSet presAssocID="{E233C00A-9D20-4632-BFBB-8C604856288A}" presName="desTx" presStyleLbl="alignAccFollowNode1" presStyleIdx="1" presStyleCnt="2">
@@ -3710,34 +3580,27 @@
         </dgm:presLayoutVars>
       </dgm:prSet>
       <dgm:spPr/>
-      <dgm:t>
-        <a:bodyPr/>
-        <a:lstStyle/>
-        <a:p>
-          <a:endParaRPr lang="en-US"/>
-        </a:p>
-      </dgm:t>
     </dgm:pt>
   </dgm:ptLst>
   <dgm:cxnLst>
+    <dgm:cxn modelId="{B2539E03-2982-4EDA-9011-B4A7DD44C08C}" type="presOf" srcId="{4A2B822F-7A5C-4F95-BD23-CB014DA30628}" destId="{C5693F82-2D1A-4D43-B9E6-6B377B763BF3}" srcOrd="0" destOrd="0" presId="urn:microsoft.com/office/officeart/2005/8/layout/hList1"/>
+    <dgm:cxn modelId="{94460912-5408-4088-88EC-A44E251B8696}" srcId="{4A2B822F-7A5C-4F95-BD23-CB014DA30628}" destId="{86F411C2-B093-46BE-874D-7A1C18AA071E}" srcOrd="2" destOrd="0" parTransId="{F411748C-E831-4BC5-A2E2-DB1C01C9767B}" sibTransId="{2804F494-E4C1-4309-9D3A-BB207F4EB98E}"/>
+    <dgm:cxn modelId="{E562CD2F-1235-4C87-8392-22AA0352B0E3}" type="presOf" srcId="{E69FE44B-0787-4E3C-B599-36730458427B}" destId="{F31D1D09-68C4-4585-9C94-72B97514B72F}" srcOrd="0" destOrd="0" presId="urn:microsoft.com/office/officeart/2005/8/layout/hList1"/>
+    <dgm:cxn modelId="{0461C234-9E2F-4EA2-9B64-5EFEEBCA55FD}" type="presOf" srcId="{1EFCA181-C033-4E25-A20E-02B95D578305}" destId="{AF0C274F-C542-4795-AAF5-EAB834A68A14}" srcOrd="0" destOrd="1" presId="urn:microsoft.com/office/officeart/2005/8/layout/hList1"/>
     <dgm:cxn modelId="{0F732E35-7B38-476D-98F7-EAA1936C99E5}" srcId="{4A2B822F-7A5C-4F95-BD23-CB014DA30628}" destId="{80EFEFB4-BFE2-491D-B03E-C4C547D268F1}" srcOrd="3" destOrd="0" parTransId="{23D54A9D-D35A-4803-8B76-DAB4FD75A9C9}" sibTransId="{4BE2827C-DC34-487D-867F-646755964C95}"/>
+    <dgm:cxn modelId="{35EBF163-2D00-4E83-8A8A-215AD7895176}" type="presOf" srcId="{86F411C2-B093-46BE-874D-7A1C18AA071E}" destId="{F31D1D09-68C4-4585-9C94-72B97514B72F}" srcOrd="0" destOrd="2" presId="urn:microsoft.com/office/officeart/2005/8/layout/hList1"/>
+    <dgm:cxn modelId="{A652B968-206E-4B2E-A3F3-CFC03628EA97}" type="presOf" srcId="{0763B94C-F74B-4575-814A-68C25EB844FC}" destId="{AF0C274F-C542-4795-AAF5-EAB834A68A14}" srcOrd="0" destOrd="2" presId="urn:microsoft.com/office/officeart/2005/8/layout/hList1"/>
+    <dgm:cxn modelId="{AEF2AD4D-1023-4E61-B87C-3FCAF6263652}" srcId="{4A2B822F-7A5C-4F95-BD23-CB014DA30628}" destId="{A9393A8A-2876-40A1-9BF8-0A73F275CE83}" srcOrd="1" destOrd="0" parTransId="{5F6B1E96-504F-4543-90D1-9F978EFE96EF}" sibTransId="{6632ED2E-9E36-443B-B265-A597199FFA41}"/>
     <dgm:cxn modelId="{E3D1C279-6D4B-476D-B8D7-57C3D483E10A}" srcId="{DE8CB968-1E11-41A8-B58C-CE8640D673D0}" destId="{E233C00A-9D20-4632-BFBB-8C604856288A}" srcOrd="1" destOrd="0" parTransId="{56E7929B-F3FE-4923-80F4-546E878AE614}" sibTransId="{24F12B7F-531A-4A50-B00D-423F6D0DEC76}"/>
-    <dgm:cxn modelId="{E562CD2F-1235-4C87-8392-22AA0352B0E3}" type="presOf" srcId="{E69FE44B-0787-4E3C-B599-36730458427B}" destId="{F31D1D09-68C4-4585-9C94-72B97514B72F}" srcOrd="0" destOrd="0" presId="urn:microsoft.com/office/officeart/2005/8/layout/hList1"/>
-    <dgm:cxn modelId="{35EBF163-2D00-4E83-8A8A-215AD7895176}" type="presOf" srcId="{86F411C2-B093-46BE-874D-7A1C18AA071E}" destId="{F31D1D09-68C4-4585-9C94-72B97514B72F}" srcOrd="0" destOrd="2" presId="urn:microsoft.com/office/officeart/2005/8/layout/hList1"/>
+    <dgm:cxn modelId="{0D32BD5A-8F2C-47DD-9E33-B6052DDCAD2F}" type="presOf" srcId="{AC83587E-88B6-493A-B91A-21104506DAC3}" destId="{AF0C274F-C542-4795-AAF5-EAB834A68A14}" srcOrd="0" destOrd="0" presId="urn:microsoft.com/office/officeart/2005/8/layout/hList1"/>
+    <dgm:cxn modelId="{A54DE299-B305-49ED-A801-018465813D67}" type="presOf" srcId="{E233C00A-9D20-4632-BFBB-8C604856288A}" destId="{63FAAAB3-D56D-4A06-A54A-0942F9DA35B2}" srcOrd="0" destOrd="0" presId="urn:microsoft.com/office/officeart/2005/8/layout/hList1"/>
+    <dgm:cxn modelId="{7A16CBA1-4C04-4B06-9EDB-7B0376F699D9}" srcId="{E233C00A-9D20-4632-BFBB-8C604856288A}" destId="{1EFCA181-C033-4E25-A20E-02B95D578305}" srcOrd="1" destOrd="0" parTransId="{E7DEE051-E359-4F5E-AB22-EC924CADB9B1}" sibTransId="{A66AA4CC-9C2B-40F6-9854-1818FCE6B6A8}"/>
+    <dgm:cxn modelId="{C1A3F3A7-CB8D-43C5-AEA1-477CFC945337}" type="presOf" srcId="{80EFEFB4-BFE2-491D-B03E-C4C547D268F1}" destId="{F31D1D09-68C4-4585-9C94-72B97514B72F}" srcOrd="0" destOrd="3" presId="urn:microsoft.com/office/officeart/2005/8/layout/hList1"/>
+    <dgm:cxn modelId="{39F034BB-C436-4E78-B076-FE5BE061BD80}" type="presOf" srcId="{A9393A8A-2876-40A1-9BF8-0A73F275CE83}" destId="{F31D1D09-68C4-4585-9C94-72B97514B72F}" srcOrd="0" destOrd="1" presId="urn:microsoft.com/office/officeart/2005/8/layout/hList1"/>
+    <dgm:cxn modelId="{5DE216CE-987F-4ADE-A443-11087B387F1A}" srcId="{DE8CB968-1E11-41A8-B58C-CE8640D673D0}" destId="{4A2B822F-7A5C-4F95-BD23-CB014DA30628}" srcOrd="0" destOrd="0" parTransId="{4BA53376-4529-476B-A14D-D3CD445BF8F9}" sibTransId="{BA601F54-B9C1-4E0E-9088-6FC1DB33DD70}"/>
     <dgm:cxn modelId="{1D2825F1-B5DD-4119-923D-9AECD099E4C7}" type="presOf" srcId="{DE8CB968-1E11-41A8-B58C-CE8640D673D0}" destId="{CEE7006C-373B-49E6-82A1-65802EA6F525}" srcOrd="0" destOrd="0" presId="urn:microsoft.com/office/officeart/2005/8/layout/hList1"/>
-    <dgm:cxn modelId="{B2539E03-2982-4EDA-9011-B4A7DD44C08C}" type="presOf" srcId="{4A2B822F-7A5C-4F95-BD23-CB014DA30628}" destId="{C5693F82-2D1A-4D43-B9E6-6B377B763BF3}" srcOrd="0" destOrd="0" presId="urn:microsoft.com/office/officeart/2005/8/layout/hList1"/>
     <dgm:cxn modelId="{3C68BEF6-19E9-4440-8F07-7BAF3375CA95}" srcId="{4A2B822F-7A5C-4F95-BD23-CB014DA30628}" destId="{E69FE44B-0787-4E3C-B599-36730458427B}" srcOrd="0" destOrd="0" parTransId="{7336EE0F-D371-45EF-B19E-B68F57FAAEEF}" sibTransId="{49166D67-67EE-4BB2-8B11-CB19CF9C2615}"/>
-    <dgm:cxn modelId="{0461C234-9E2F-4EA2-9B64-5EFEEBCA55FD}" type="presOf" srcId="{1EFCA181-C033-4E25-A20E-02B95D578305}" destId="{AF0C274F-C542-4795-AAF5-EAB834A68A14}" srcOrd="0" destOrd="1" presId="urn:microsoft.com/office/officeart/2005/8/layout/hList1"/>
-    <dgm:cxn modelId="{5DE216CE-987F-4ADE-A443-11087B387F1A}" srcId="{DE8CB968-1E11-41A8-B58C-CE8640D673D0}" destId="{4A2B822F-7A5C-4F95-BD23-CB014DA30628}" srcOrd="0" destOrd="0" parTransId="{4BA53376-4529-476B-A14D-D3CD445BF8F9}" sibTransId="{BA601F54-B9C1-4E0E-9088-6FC1DB33DD70}"/>
-    <dgm:cxn modelId="{A54DE299-B305-49ED-A801-018465813D67}" type="presOf" srcId="{E233C00A-9D20-4632-BFBB-8C604856288A}" destId="{63FAAAB3-D56D-4A06-A54A-0942F9DA35B2}" srcOrd="0" destOrd="0" presId="urn:microsoft.com/office/officeart/2005/8/layout/hList1"/>
-    <dgm:cxn modelId="{0D32BD5A-8F2C-47DD-9E33-B6052DDCAD2F}" type="presOf" srcId="{AC83587E-88B6-493A-B91A-21104506DAC3}" destId="{AF0C274F-C542-4795-AAF5-EAB834A68A14}" srcOrd="0" destOrd="0" presId="urn:microsoft.com/office/officeart/2005/8/layout/hList1"/>
-    <dgm:cxn modelId="{A652B968-206E-4B2E-A3F3-CFC03628EA97}" type="presOf" srcId="{0763B94C-F74B-4575-814A-68C25EB844FC}" destId="{AF0C274F-C542-4795-AAF5-EAB834A68A14}" srcOrd="0" destOrd="2" presId="urn:microsoft.com/office/officeart/2005/8/layout/hList1"/>
-    <dgm:cxn modelId="{7A16CBA1-4C04-4B06-9EDB-7B0376F699D9}" srcId="{E233C00A-9D20-4632-BFBB-8C604856288A}" destId="{1EFCA181-C033-4E25-A20E-02B95D578305}" srcOrd="1" destOrd="0" parTransId="{E7DEE051-E359-4F5E-AB22-EC924CADB9B1}" sibTransId="{A66AA4CC-9C2B-40F6-9854-1818FCE6B6A8}"/>
-    <dgm:cxn modelId="{39F034BB-C436-4E78-B076-FE5BE061BD80}" type="presOf" srcId="{A9393A8A-2876-40A1-9BF8-0A73F275CE83}" destId="{F31D1D09-68C4-4585-9C94-72B97514B72F}" srcOrd="0" destOrd="1" presId="urn:microsoft.com/office/officeart/2005/8/layout/hList1"/>
-    <dgm:cxn modelId="{C1A3F3A7-CB8D-43C5-AEA1-477CFC945337}" type="presOf" srcId="{80EFEFB4-BFE2-491D-B03E-C4C547D268F1}" destId="{F31D1D09-68C4-4585-9C94-72B97514B72F}" srcOrd="0" destOrd="3" presId="urn:microsoft.com/office/officeart/2005/8/layout/hList1"/>
-    <dgm:cxn modelId="{AEF2AD4D-1023-4E61-B87C-3FCAF6263652}" srcId="{4A2B822F-7A5C-4F95-BD23-CB014DA30628}" destId="{A9393A8A-2876-40A1-9BF8-0A73F275CE83}" srcOrd="1" destOrd="0" parTransId="{5F6B1E96-504F-4543-90D1-9F978EFE96EF}" sibTransId="{6632ED2E-9E36-443B-B265-A597199FFA41}"/>
     <dgm:cxn modelId="{040710F7-F722-4025-AD13-FC70D19C56EC}" srcId="{E233C00A-9D20-4632-BFBB-8C604856288A}" destId="{AC83587E-88B6-493A-B91A-21104506DAC3}" srcOrd="0" destOrd="0" parTransId="{2D280084-5FEF-49AF-A635-4F65DD533670}" sibTransId="{802E83AC-6B49-4412-B836-40567128BF9F}"/>
-    <dgm:cxn modelId="{94460912-5408-4088-88EC-A44E251B8696}" srcId="{4A2B822F-7A5C-4F95-BD23-CB014DA30628}" destId="{86F411C2-B093-46BE-874D-7A1C18AA071E}" srcOrd="2" destOrd="0" parTransId="{F411748C-E831-4BC5-A2E2-DB1C01C9767B}" sibTransId="{2804F494-E4C1-4309-9D3A-BB207F4EB98E}"/>
     <dgm:cxn modelId="{FB2E48F7-D6FF-482C-8A2F-94D31ED2F910}" srcId="{E233C00A-9D20-4632-BFBB-8C604856288A}" destId="{0763B94C-F74B-4575-814A-68C25EB844FC}" srcOrd="2" destOrd="0" parTransId="{672F41A8-4F96-48B6-B0E7-14D26F3CE1ED}" sibTransId="{61943F02-743F-4BBC-8D1D-F3AF6D39B5DB}"/>
     <dgm:cxn modelId="{3679838D-E802-4B43-8BD3-B097A84BB4A0}" type="presParOf" srcId="{CEE7006C-373B-49E6-82A1-65802EA6F525}" destId="{CBBC936C-2FDE-42E7-9F0E-06687D3FCB78}" srcOrd="0" destOrd="0" presId="urn:microsoft.com/office/officeart/2005/8/layout/hList1"/>
     <dgm:cxn modelId="{9CE3A074-7D71-4460-9FD7-C6316C7B9C49}" type="presParOf" srcId="{CBBC936C-2FDE-42E7-9F0E-06687D3FCB78}" destId="{C5693F82-2D1A-4D43-B9E6-6B377B763BF3}" srcOrd="0" destOrd="0" presId="urn:microsoft.com/office/officeart/2005/8/layout/hList1"/>
@@ -3819,7 +3682,7 @@
         </a:bodyPr>
         <a:lstStyle/>
         <a:p>
-          <a:pPr lvl="0" algn="ctr" defTabSz="844550">
+          <a:pPr marL="0" lvl="0" indent="0" algn="ctr" defTabSz="844550">
             <a:lnSpc>
               <a:spcPct val="90000"/>
             </a:lnSpc>
@@ -3829,6 +3692,7 @@
             <a:spcAft>
               <a:spcPct val="35000"/>
             </a:spcAft>
+            <a:buNone/>
           </a:pPr>
           <a:r>
             <a:rPr lang="en-US" sz="1900" kern="1200" dirty="0"/>
@@ -3895,7 +3759,7 @@
         </a:bodyPr>
         <a:lstStyle/>
         <a:p>
-          <a:pPr lvl="0" algn="ctr" defTabSz="844550">
+          <a:pPr marL="0" lvl="0" indent="0" algn="ctr" defTabSz="844550">
             <a:lnSpc>
               <a:spcPct val="90000"/>
             </a:lnSpc>
@@ -3905,6 +3769,7 @@
             <a:spcAft>
               <a:spcPct val="35000"/>
             </a:spcAft>
+            <a:buNone/>
           </a:pPr>
           <a:r>
             <a:rPr lang="en-US" sz="1900" kern="1200" dirty="0"/>
@@ -3971,7 +3836,7 @@
         </a:bodyPr>
         <a:lstStyle/>
         <a:p>
-          <a:pPr lvl="0" algn="ctr" defTabSz="844550">
+          <a:pPr marL="0" lvl="0" indent="0" algn="ctr" defTabSz="844550">
             <a:lnSpc>
               <a:spcPct val="90000"/>
             </a:lnSpc>
@@ -3981,6 +3846,7 @@
             <a:spcAft>
               <a:spcPct val="35000"/>
             </a:spcAft>
+            <a:buNone/>
           </a:pPr>
           <a:r>
             <a:rPr lang="en-US" sz="1900" kern="1200" dirty="0"/>
@@ -4047,7 +3913,7 @@
         </a:bodyPr>
         <a:lstStyle/>
         <a:p>
-          <a:pPr lvl="0" algn="ctr" defTabSz="844550">
+          <a:pPr marL="0" lvl="0" indent="0" algn="ctr" defTabSz="844550">
             <a:lnSpc>
               <a:spcPct val="90000"/>
             </a:lnSpc>
@@ -4057,6 +3923,7 @@
             <a:spcAft>
               <a:spcPct val="35000"/>
             </a:spcAft>
+            <a:buNone/>
           </a:pPr>
           <a:r>
             <a:rPr lang="en-US" sz="1900" kern="1200" dirty="0"/>
@@ -4123,7 +3990,7 @@
         </a:bodyPr>
         <a:lstStyle/>
         <a:p>
-          <a:pPr lvl="0" algn="ctr" defTabSz="844550">
+          <a:pPr marL="0" lvl="0" indent="0" algn="ctr" defTabSz="844550">
             <a:lnSpc>
               <a:spcPct val="90000"/>
             </a:lnSpc>
@@ -4133,6 +4000,7 @@
             <a:spcAft>
               <a:spcPct val="35000"/>
             </a:spcAft>
+            <a:buNone/>
           </a:pPr>
           <a:r>
             <a:rPr lang="en-US" sz="1900" kern="1200" dirty="0"/>
@@ -4199,7 +4067,7 @@
         </a:bodyPr>
         <a:lstStyle/>
         <a:p>
-          <a:pPr lvl="0" algn="ctr" defTabSz="844550">
+          <a:pPr marL="0" lvl="0" indent="0" algn="ctr" defTabSz="844550">
             <a:lnSpc>
               <a:spcPct val="90000"/>
             </a:lnSpc>
@@ -4209,6 +4077,7 @@
             <a:spcAft>
               <a:spcPct val="35000"/>
             </a:spcAft>
+            <a:buNone/>
           </a:pPr>
           <a:r>
             <a:rPr lang="en-US" sz="1900" kern="1200" dirty="0"/>
@@ -4275,7 +4144,7 @@
         </a:bodyPr>
         <a:lstStyle/>
         <a:p>
-          <a:pPr lvl="0" algn="ctr" defTabSz="844550">
+          <a:pPr marL="0" lvl="0" indent="0" algn="ctr" defTabSz="844550">
             <a:lnSpc>
               <a:spcPct val="90000"/>
             </a:lnSpc>
@@ -4285,6 +4154,7 @@
             <a:spcAft>
               <a:spcPct val="35000"/>
             </a:spcAft>
+            <a:buNone/>
           </a:pPr>
           <a:r>
             <a:rPr lang="en-US" sz="1900" kern="1200" dirty="0"/>
@@ -4363,7 +4233,7 @@
         </a:bodyPr>
         <a:lstStyle/>
         <a:p>
-          <a:pPr lvl="0" algn="ctr" defTabSz="844550">
+          <a:pPr marL="0" lvl="0" indent="0" algn="ctr" defTabSz="844550">
             <a:lnSpc>
               <a:spcPct val="90000"/>
             </a:lnSpc>
@@ -4373,6 +4243,7 @@
             <a:spcAft>
               <a:spcPct val="35000"/>
             </a:spcAft>
+            <a:buNone/>
           </a:pPr>
           <a:r>
             <a:rPr lang="en-US" sz="1900" kern="1200" dirty="0"/>
@@ -4439,7 +4310,7 @@
         </a:bodyPr>
         <a:lstStyle/>
         <a:p>
-          <a:pPr lvl="0" algn="ctr" defTabSz="844550">
+          <a:pPr marL="0" lvl="0" indent="0" algn="ctr" defTabSz="844550">
             <a:lnSpc>
               <a:spcPct val="90000"/>
             </a:lnSpc>
@@ -4449,6 +4320,7 @@
             <a:spcAft>
               <a:spcPct val="35000"/>
             </a:spcAft>
+            <a:buNone/>
           </a:pPr>
           <a:r>
             <a:rPr lang="en-US" sz="1900" kern="1200" dirty="0"/>
@@ -4515,7 +4387,7 @@
         </a:bodyPr>
         <a:lstStyle/>
         <a:p>
-          <a:pPr lvl="0" algn="ctr" defTabSz="844550">
+          <a:pPr marL="0" lvl="0" indent="0" algn="ctr" defTabSz="844550">
             <a:lnSpc>
               <a:spcPct val="90000"/>
             </a:lnSpc>
@@ -4525,6 +4397,7 @@
             <a:spcAft>
               <a:spcPct val="35000"/>
             </a:spcAft>
+            <a:buNone/>
           </a:pPr>
           <a:r>
             <a:rPr lang="en-US" sz="1900" kern="1200" dirty="0"/>
@@ -4591,7 +4464,7 @@
         </a:bodyPr>
         <a:lstStyle/>
         <a:p>
-          <a:pPr lvl="0" algn="ctr" defTabSz="844550">
+          <a:pPr marL="0" lvl="0" indent="0" algn="ctr" defTabSz="844550">
             <a:lnSpc>
               <a:spcPct val="90000"/>
             </a:lnSpc>
@@ -4601,6 +4474,7 @@
             <a:spcAft>
               <a:spcPct val="35000"/>
             </a:spcAft>
+            <a:buNone/>
           </a:pPr>
           <a:r>
             <a:rPr lang="en-US" sz="1900" kern="1200" dirty="0"/>
@@ -4667,7 +4541,7 @@
         </a:bodyPr>
         <a:lstStyle/>
         <a:p>
-          <a:pPr lvl="0" algn="ctr" defTabSz="844550">
+          <a:pPr marL="0" lvl="0" indent="0" algn="ctr" defTabSz="844550">
             <a:lnSpc>
               <a:spcPct val="90000"/>
             </a:lnSpc>
@@ -4677,6 +4551,7 @@
             <a:spcAft>
               <a:spcPct val="35000"/>
             </a:spcAft>
+            <a:buNone/>
           </a:pPr>
           <a:r>
             <a:rPr lang="en-US" sz="1900" kern="1200" dirty="0"/>
@@ -4755,7 +4630,7 @@
         </a:bodyPr>
         <a:lstStyle/>
         <a:p>
-          <a:pPr lvl="0" algn="ctr" defTabSz="1778000">
+          <a:pPr marL="0" lvl="0" indent="0" algn="ctr" defTabSz="1778000">
             <a:lnSpc>
               <a:spcPct val="90000"/>
             </a:lnSpc>
@@ -4765,6 +4640,7 @@
             <a:spcAft>
               <a:spcPct val="35000"/>
             </a:spcAft>
+            <a:buNone/>
           </a:pPr>
           <a:r>
             <a:rPr lang="en-US" sz="4000" kern="1200" dirty="0"/>
@@ -4843,7 +4719,7 @@
             <a:spcAft>
               <a:spcPct val="15000"/>
             </a:spcAft>
-            <a:buChar char="••"/>
+            <a:buChar char="•"/>
           </a:pPr>
           <a:r>
             <a:rPr lang="en-US" sz="3200" kern="1200" dirty="0"/>
@@ -4861,7 +4737,7 @@
             <a:spcAft>
               <a:spcPct val="15000"/>
             </a:spcAft>
-            <a:buChar char="••"/>
+            <a:buChar char="•"/>
           </a:pPr>
           <a:r>
             <a:rPr lang="en-US" sz="3200" kern="1200" dirty="0"/>
@@ -4879,7 +4755,7 @@
             <a:spcAft>
               <a:spcPct val="15000"/>
             </a:spcAft>
-            <a:buChar char="••"/>
+            <a:buChar char="•"/>
           </a:pPr>
           <a:r>
             <a:rPr lang="en-US" sz="3200" kern="1200" dirty="0"/>
@@ -4897,7 +4773,7 @@
             <a:spcAft>
               <a:spcPct val="15000"/>
             </a:spcAft>
-            <a:buChar char="••"/>
+            <a:buChar char="•"/>
           </a:pPr>
           <a:r>
             <a:rPr lang="en-US" sz="3200" kern="1200" dirty="0"/>
@@ -4964,7 +4840,7 @@
         </a:bodyPr>
         <a:lstStyle/>
         <a:p>
-          <a:pPr lvl="0" algn="ctr" defTabSz="1778000">
+          <a:pPr marL="0" lvl="0" indent="0" algn="ctr" defTabSz="1778000">
             <a:lnSpc>
               <a:spcPct val="90000"/>
             </a:lnSpc>
@@ -4974,6 +4850,7 @@
             <a:spcAft>
               <a:spcPct val="35000"/>
             </a:spcAft>
+            <a:buNone/>
           </a:pPr>
           <a:r>
             <a:rPr lang="en-US" sz="4000" kern="1200" dirty="0"/>
@@ -5052,7 +4929,7 @@
             <a:spcAft>
               <a:spcPct val="15000"/>
             </a:spcAft>
-            <a:buChar char="••"/>
+            <a:buChar char="•"/>
           </a:pPr>
           <a:r>
             <a:rPr lang="en-US" sz="3200" kern="1200" dirty="0"/>
@@ -5070,7 +4947,7 @@
             <a:spcAft>
               <a:spcPct val="15000"/>
             </a:spcAft>
-            <a:buChar char="••"/>
+            <a:buChar char="•"/>
           </a:pPr>
           <a:r>
             <a:rPr lang="en-US" sz="3200" kern="1200" dirty="0"/>
@@ -5088,7 +4965,7 @@
             <a:spcAft>
               <a:spcPct val="15000"/>
             </a:spcAft>
-            <a:buChar char="••"/>
+            <a:buChar char="•"/>
           </a:pPr>
           <a:r>
             <a:rPr lang="en-US" sz="3200" kern="1200" dirty="0"/>
@@ -8804,7 +8681,7 @@
               <a:rPr lang="en-US" smtClean="0">
                 <a:latin typeface="Segoe UI" pitchFamily="34" charset="0"/>
               </a:rPr>
-              <a:t>12/4/2017 11:07 PM</a:t>
+              <a:t>1/31/2018 4:31 PM</a:t>
             </a:fld>
             <a:endParaRPr lang="en-US" dirty="0">
               <a:latin typeface="Segoe UI" pitchFamily="34" charset="0"/>
@@ -8893,7 +8770,7 @@
               <a:rPr lang="en-US" smtClean="0">
                 <a:latin typeface="Segoe UI" pitchFamily="34" charset="0"/>
               </a:rPr>
-              <a:t>‹#›</a:t>
+              <a:t>‹Nr.›</a:t>
             </a:fld>
             <a:endParaRPr lang="en-US" dirty="0">
               <a:latin typeface="Segoe UI" pitchFamily="34" charset="0"/>
@@ -9082,7 +8959,7 @@
           <a:p>
             <a:fld id="{196BB360-4395-422C-A729-CB974B278917}" type="datetime8">
               <a:rPr lang="en-US" smtClean="0"/>
-              <a:t>12/4/2017 11:07 PM</a:t>
+              <a:t>1/31/2018 4:31 PM</a:t>
             </a:fld>
             <a:endParaRPr lang="en-US" dirty="0"/>
           </a:p>
@@ -9179,7 +9056,7 @@
             <a:fld id="{B4008EB6-D09E-4580-8CD6-DDB14511944F}" type="slidenum">
               <a:rPr lang="en-US" smtClean="0"/>
               <a:pPr/>
-              <a:t>‹#›</a:t>
+              <a:t>‹Nr.›</a:t>
             </a:fld>
             <a:endParaRPr lang="en-US" dirty="0"/>
           </a:p>
@@ -9411,7 +9288,7 @@
           <a:p>
             <a:fld id="{B9E68977-C62F-48C1-B8E5-A952982F1FDC}" type="datetime8">
               <a:rPr lang="en-US" smtClean="0"/>
-              <a:t>12/4/2017 11:07 PM</a:t>
+              <a:t>1/31/2018 4:31 PM</a:t>
             </a:fld>
             <a:endParaRPr lang="en-US" dirty="0"/>
           </a:p>
@@ -9617,7 +9494,7 @@
           <a:p>
             <a:fld id="{196BB360-4395-422C-A729-CB974B278917}" type="datetime8">
               <a:rPr lang="en-US" smtClean="0"/>
-              <a:t>12/4/2017 11:07 PM</a:t>
+              <a:t>1/31/2018 4:31 PM</a:t>
             </a:fld>
             <a:endParaRPr lang="en-US" dirty="0"/>
           </a:p>
@@ -9744,7 +9621,7 @@
           <a:p>
             <a:pPr marL="398463" defTabSz="914099" eaLnBrk="0" hangingPunct="0"/>
             <a:r>
-              <a:rPr lang="en-US" sz="400" smtClean="0">
+              <a:rPr lang="en-US" sz="400">
                 <a:gradFill>
                   <a:gsLst>
                     <a:gs pos="0">
@@ -9798,7 +9675,7 @@
           <a:p>
             <a:fld id="{196BB360-4395-422C-A729-CB974B278917}" type="datetime8">
               <a:rPr lang="en-US" smtClean="0"/>
-              <a:t>12/4/2017 11:10 PM</a:t>
+              <a:t>1/31/2018 4:31 PM</a:t>
             </a:fld>
             <a:endParaRPr lang="en-US" dirty="0"/>
           </a:p>
@@ -9925,7 +9802,7 @@
           <a:p>
             <a:pPr marL="398463" defTabSz="914099" eaLnBrk="0" hangingPunct="0"/>
             <a:r>
-              <a:rPr lang="en-US" sz="400" smtClean="0">
+              <a:rPr lang="en-US" sz="400">
                 <a:gradFill>
                   <a:gsLst>
                     <a:gs pos="0">
@@ -9979,7 +9856,7 @@
           <a:p>
             <a:fld id="{196BB360-4395-422C-A729-CB974B278917}" type="datetime8">
               <a:rPr lang="en-US" smtClean="0"/>
-              <a:t>12/4/2017 11:07 PM</a:t>
+              <a:t>1/31/2018 4:31 PM</a:t>
             </a:fld>
             <a:endParaRPr lang="en-US" dirty="0"/>
           </a:p>
@@ -10106,7 +9983,7 @@
           <a:p>
             <a:pPr marL="398463" defTabSz="914099" eaLnBrk="0" hangingPunct="0"/>
             <a:r>
-              <a:rPr lang="en-US" sz="400" smtClean="0">
+              <a:rPr lang="en-US" sz="400">
                 <a:gradFill>
                   <a:gsLst>
                     <a:gs pos="0">
@@ -10160,7 +10037,7 @@
           <a:p>
             <a:fld id="{196BB360-4395-422C-A729-CB974B278917}" type="datetime8">
               <a:rPr lang="en-US" smtClean="0"/>
-              <a:t>12/4/2017 11:07 PM</a:t>
+              <a:t>1/31/2018 4:31 PM</a:t>
             </a:fld>
             <a:endParaRPr lang="en-US" dirty="0"/>
           </a:p>
@@ -10287,7 +10164,7 @@
           <a:p>
             <a:pPr marL="398463" defTabSz="914099" eaLnBrk="0" hangingPunct="0"/>
             <a:r>
-              <a:rPr lang="en-US" sz="400" smtClean="0">
+              <a:rPr lang="en-US" sz="400">
                 <a:gradFill>
                   <a:gsLst>
                     <a:gs pos="0">
@@ -10341,7 +10218,7 @@
           <a:p>
             <a:fld id="{196BB360-4395-422C-A729-CB974B278917}" type="datetime8">
               <a:rPr lang="en-US" smtClean="0"/>
-              <a:t>12/4/2017 11:07 PM</a:t>
+              <a:t>1/31/2018 4:31 PM</a:t>
             </a:fld>
             <a:endParaRPr lang="en-US" dirty="0"/>
           </a:p>
@@ -10550,7 +10427,7 @@
           <a:p>
             <a:fld id="{196BB360-4395-422C-A729-CB974B278917}" type="datetime8">
               <a:rPr lang="en-US" smtClean="0"/>
-              <a:t>12/4/2017 11:07 PM</a:t>
+              <a:t>1/31/2018 4:31 PM</a:t>
             </a:fld>
             <a:endParaRPr lang="en-US" dirty="0"/>
           </a:p>
@@ -10677,7 +10554,7 @@
           <a:p>
             <a:pPr marL="398463" defTabSz="914099" eaLnBrk="0" hangingPunct="0"/>
             <a:r>
-              <a:rPr lang="en-US" sz="400" smtClean="0">
+              <a:rPr lang="en-US" sz="400">
                 <a:gradFill>
                   <a:gsLst>
                     <a:gs pos="0">
@@ -10731,7 +10608,7 @@
           <a:p>
             <a:fld id="{196BB360-4395-422C-A729-CB974B278917}" type="datetime8">
               <a:rPr lang="en-US" smtClean="0"/>
-              <a:t>12/4/2017 11:07 PM</a:t>
+              <a:t>1/31/2018 4:31 PM</a:t>
             </a:fld>
             <a:endParaRPr lang="en-US" dirty="0"/>
           </a:p>
@@ -10858,7 +10735,7 @@
           <a:p>
             <a:pPr marL="398463" defTabSz="914099" eaLnBrk="0" hangingPunct="0"/>
             <a:r>
-              <a:rPr lang="en-US" sz="400" smtClean="0">
+              <a:rPr lang="en-US" sz="400">
                 <a:gradFill>
                   <a:gsLst>
                     <a:gs pos="0">
@@ -10912,7 +10789,7 @@
           <a:p>
             <a:fld id="{196BB360-4395-422C-A729-CB974B278917}" type="datetime8">
               <a:rPr lang="en-US" smtClean="0"/>
-              <a:t>12/4/2017 11:07 PM</a:t>
+              <a:t>1/31/2018 4:31 PM</a:t>
             </a:fld>
             <a:endParaRPr lang="en-US" dirty="0"/>
           </a:p>
@@ -11039,7 +10916,7 @@
           <a:p>
             <a:pPr marL="398463" defTabSz="914099" eaLnBrk="0" hangingPunct="0"/>
             <a:r>
-              <a:rPr lang="en-US" sz="400" smtClean="0">
+              <a:rPr lang="en-US" sz="400">
                 <a:gradFill>
                   <a:gsLst>
                     <a:gs pos="0">
@@ -11093,7 +10970,7 @@
           <a:p>
             <a:fld id="{196BB360-4395-422C-A729-CB974B278917}" type="datetime8">
               <a:rPr lang="en-US" smtClean="0"/>
-              <a:t>12/4/2017 11:07 PM</a:t>
+              <a:t>1/31/2018 4:31 PM</a:t>
             </a:fld>
             <a:endParaRPr lang="en-US" dirty="0"/>
           </a:p>
@@ -11220,7 +11097,7 @@
           <a:p>
             <a:pPr marL="398463" defTabSz="914099" eaLnBrk="0" hangingPunct="0"/>
             <a:r>
-              <a:rPr lang="en-US" sz="400" smtClean="0">
+              <a:rPr lang="en-US" sz="400">
                 <a:gradFill>
                   <a:gsLst>
                     <a:gs pos="0">
@@ -11274,7 +11151,7 @@
           <a:p>
             <a:fld id="{196BB360-4395-422C-A729-CB974B278917}" type="datetime8">
               <a:rPr lang="en-US" smtClean="0"/>
-              <a:t>12/4/2017 11:07 PM</a:t>
+              <a:t>1/31/2018 4:31 PM</a:t>
             </a:fld>
             <a:endParaRPr lang="en-US" dirty="0"/>
           </a:p>
@@ -11401,7 +11278,7 @@
           <a:p>
             <a:pPr marL="398463" defTabSz="914099" eaLnBrk="0" hangingPunct="0"/>
             <a:r>
-              <a:rPr lang="en-US" sz="400" smtClean="0">
+              <a:rPr lang="en-US" sz="400">
                 <a:gradFill>
                   <a:gsLst>
                     <a:gs pos="0">
@@ -11455,7 +11332,7 @@
           <a:p>
             <a:fld id="{196BB360-4395-422C-A729-CB974B278917}" type="datetime8">
               <a:rPr lang="en-US" smtClean="0"/>
-              <a:t>12/4/2017 11:07 PM</a:t>
+              <a:t>1/31/2018 4:31 PM</a:t>
             </a:fld>
             <a:endParaRPr lang="en-US" dirty="0"/>
           </a:p>
@@ -11620,7 +11497,7 @@
           <a:p>
             <a:fld id="{196BB360-4395-422C-A729-CB974B278917}" type="datetime8">
               <a:rPr lang="en-US" smtClean="0"/>
-              <a:t>12/4/2017 11:07 PM</a:t>
+              <a:t>1/31/2018 4:31 PM</a:t>
             </a:fld>
             <a:endParaRPr lang="en-US" dirty="0"/>
           </a:p>
@@ -11788,7 +11665,7 @@
           <a:p>
             <a:fld id="{196BB360-4395-422C-A729-CB974B278917}" type="datetime8">
               <a:rPr lang="en-US" smtClean="0"/>
-              <a:t>12/4/2017 11:07 PM</a:t>
+              <a:t>1/31/2018 4:31 PM</a:t>
             </a:fld>
             <a:endParaRPr lang="en-US" dirty="0"/>
           </a:p>
@@ -11915,7 +11792,7 @@
           <a:p>
             <a:pPr marL="398463" defTabSz="914099" eaLnBrk="0" hangingPunct="0"/>
             <a:r>
-              <a:rPr lang="en-US" sz="400" smtClean="0">
+              <a:rPr lang="en-US" sz="400">
                 <a:gradFill>
                   <a:gsLst>
                     <a:gs pos="0">
@@ -11969,7 +11846,7 @@
           <a:p>
             <a:fld id="{196BB360-4395-422C-A729-CB974B278917}" type="datetime8">
               <a:rPr lang="en-US" smtClean="0"/>
-              <a:t>12/4/2017 11:07 PM</a:t>
+              <a:t>1/31/2018 4:31 PM</a:t>
             </a:fld>
             <a:endParaRPr lang="en-US" dirty="0"/>
           </a:p>
@@ -12096,7 +11973,7 @@
           <a:p>
             <a:pPr marL="398463" defTabSz="914099" eaLnBrk="0" hangingPunct="0"/>
             <a:r>
-              <a:rPr lang="en-US" sz="400" smtClean="0">
+              <a:rPr lang="en-US" sz="400">
                 <a:gradFill>
                   <a:gsLst>
                     <a:gs pos="0">
@@ -12150,7 +12027,7 @@
           <a:p>
             <a:fld id="{196BB360-4395-422C-A729-CB974B278917}" type="datetime8">
               <a:rPr lang="en-US" smtClean="0"/>
-              <a:t>12/4/2017 11:07 PM</a:t>
+              <a:t>1/31/2018 4:31 PM</a:t>
             </a:fld>
             <a:endParaRPr lang="en-US" dirty="0"/>
           </a:p>
@@ -12351,7 +12228,7 @@
           <a:p>
             <a:fld id="{196BB360-4395-422C-A729-CB974B278917}" type="datetime8">
               <a:rPr lang="en-US" smtClean="0"/>
-              <a:t>12/4/2017 11:07 PM</a:t>
+              <a:t>1/31/2018 4:31 PM</a:t>
             </a:fld>
             <a:endParaRPr lang="en-US" dirty="0"/>
           </a:p>
@@ -12536,7 +12413,7 @@
           <a:p>
             <a:fld id="{38EEC551-8CDA-4EB6-89BB-2A86C9F091C8}" type="datetime8">
               <a:rPr lang="en-US" smtClean="0"/>
-              <a:t>12/4/2017 11:07 PM</a:t>
+              <a:t>1/31/2018 4:31 PM</a:t>
             </a:fld>
             <a:endParaRPr lang="en-US" dirty="0"/>
           </a:p>
@@ -12663,7 +12540,7 @@
           <a:p>
             <a:pPr marL="398463" defTabSz="914099" eaLnBrk="0" hangingPunct="0"/>
             <a:r>
-              <a:rPr lang="en-US" sz="400" smtClean="0">
+              <a:rPr lang="en-US" sz="400">
                 <a:gradFill>
                   <a:gsLst>
                     <a:gs pos="0">
@@ -12717,7 +12594,7 @@
           <a:p>
             <a:fld id="{196BB360-4395-422C-A729-CB974B278917}" type="datetime8">
               <a:rPr lang="en-US" smtClean="0"/>
-              <a:t>12/4/2017 11:07 PM</a:t>
+              <a:t>1/31/2018 4:31 PM</a:t>
             </a:fld>
             <a:endParaRPr lang="en-US" dirty="0"/>
           </a:p>
@@ -12844,7 +12721,7 @@
           <a:p>
             <a:pPr marL="398463" defTabSz="914099" eaLnBrk="0" hangingPunct="0"/>
             <a:r>
-              <a:rPr lang="en-US" sz="400" smtClean="0">
+              <a:rPr lang="en-US" sz="400">
                 <a:gradFill>
                   <a:gsLst>
                     <a:gs pos="0">
@@ -12898,7 +12775,7 @@
           <a:p>
             <a:fld id="{196BB360-4395-422C-A729-CB974B278917}" type="datetime8">
               <a:rPr lang="en-US" smtClean="0"/>
-              <a:t>12/4/2017 11:07 PM</a:t>
+              <a:t>1/31/2018 4:31 PM</a:t>
             </a:fld>
             <a:endParaRPr lang="en-US" dirty="0"/>
           </a:p>
@@ -13025,7 +12902,7 @@
           <a:p>
             <a:pPr marL="398463" defTabSz="914099" eaLnBrk="0" hangingPunct="0"/>
             <a:r>
-              <a:rPr lang="en-US" sz="400" smtClean="0">
+              <a:rPr lang="en-US" sz="400">
                 <a:gradFill>
                   <a:gsLst>
                     <a:gs pos="0">
@@ -13079,7 +12956,7 @@
           <a:p>
             <a:fld id="{196BB360-4395-422C-A729-CB974B278917}" type="datetime8">
               <a:rPr lang="en-US" smtClean="0"/>
-              <a:t>12/4/2017 11:07 PM</a:t>
+              <a:t>1/31/2018 4:31 PM</a:t>
             </a:fld>
             <a:endParaRPr lang="en-US" dirty="0"/>
           </a:p>
@@ -13206,7 +13083,7 @@
           <a:p>
             <a:pPr marL="398463" defTabSz="914099" eaLnBrk="0" hangingPunct="0"/>
             <a:r>
-              <a:rPr lang="en-US" sz="400" smtClean="0">
+              <a:rPr lang="en-US" sz="400">
                 <a:gradFill>
                   <a:gsLst>
                     <a:gs pos="0">
@@ -13260,7 +13137,7 @@
           <a:p>
             <a:fld id="{196BB360-4395-422C-A729-CB974B278917}" type="datetime8">
               <a:rPr lang="en-US" smtClean="0"/>
-              <a:t>12/4/2017 11:07 PM</a:t>
+              <a:t>1/31/2018 4:31 PM</a:t>
             </a:fld>
             <a:endParaRPr lang="en-US" dirty="0"/>
           </a:p>
@@ -13387,7 +13264,7 @@
           <a:p>
             <a:pPr marL="398463" defTabSz="914099" eaLnBrk="0" hangingPunct="0"/>
             <a:r>
-              <a:rPr lang="en-US" sz="400" smtClean="0">
+              <a:rPr lang="en-US" sz="400">
                 <a:gradFill>
                   <a:gsLst>
                     <a:gs pos="0">
@@ -13441,7 +13318,7 @@
           <a:p>
             <a:fld id="{196BB360-4395-422C-A729-CB974B278917}" type="datetime8">
               <a:rPr lang="en-US" smtClean="0"/>
-              <a:t>12/4/2017 11:07 PM</a:t>
+              <a:t>1/31/2018 4:31 PM</a:t>
             </a:fld>
             <a:endParaRPr lang="en-US" dirty="0"/>
           </a:p>
@@ -13568,7 +13445,7 @@
           <a:p>
             <a:pPr marL="398463" defTabSz="914099" eaLnBrk="0" hangingPunct="0"/>
             <a:r>
-              <a:rPr lang="en-US" sz="400" smtClean="0">
+              <a:rPr lang="en-US" sz="400">
                 <a:gradFill>
                   <a:gsLst>
                     <a:gs pos="0">
@@ -13622,7 +13499,7 @@
           <a:p>
             <a:fld id="{196BB360-4395-422C-A729-CB974B278917}" type="datetime8">
               <a:rPr lang="en-US" smtClean="0"/>
-              <a:t>12/4/2017 11:07 PM</a:t>
+              <a:t>1/31/2018 4:31 PM</a:t>
             </a:fld>
             <a:endParaRPr lang="en-US" dirty="0"/>
           </a:p>
@@ -13749,7 +13626,7 @@
           <a:p>
             <a:pPr marL="398463" defTabSz="914099" eaLnBrk="0" hangingPunct="0"/>
             <a:r>
-              <a:rPr lang="en-US" sz="400" smtClean="0">
+              <a:rPr lang="en-US" sz="400">
                 <a:gradFill>
                   <a:gsLst>
                     <a:gs pos="0">
@@ -13803,7 +13680,7 @@
           <a:p>
             <a:fld id="{196BB360-4395-422C-A729-CB974B278917}" type="datetime8">
               <a:rPr lang="en-US" smtClean="0"/>
-              <a:t>12/4/2017 11:07 PM</a:t>
+              <a:t>1/31/2018 4:31 PM</a:t>
             </a:fld>
             <a:endParaRPr lang="en-US" dirty="0"/>
           </a:p>
@@ -14131,7 +14008,7 @@
           <a:p>
             <a:fld id="{196BB360-4395-422C-A729-CB974B278917}" type="datetime8">
               <a:rPr lang="en-US" smtClean="0"/>
-              <a:t>12/4/2017 11:07 PM</a:t>
+              <a:t>1/31/2018 4:31 PM</a:t>
             </a:fld>
             <a:endParaRPr lang="en-US" dirty="0"/>
           </a:p>
@@ -14258,7 +14135,7 @@
           <a:p>
             <a:pPr marL="398463" defTabSz="914099" eaLnBrk="0" hangingPunct="0"/>
             <a:r>
-              <a:rPr lang="en-US" sz="400" smtClean="0">
+              <a:rPr lang="en-US" sz="400">
                 <a:gradFill>
                   <a:gsLst>
                     <a:gs pos="0">
@@ -14312,7 +14189,7 @@
           <a:p>
             <a:fld id="{196BB360-4395-422C-A729-CB974B278917}" type="datetime8">
               <a:rPr lang="en-US" smtClean="0"/>
-              <a:t>12/4/2017 11:07 PM</a:t>
+              <a:t>1/31/2018 4:31 PM</a:t>
             </a:fld>
             <a:endParaRPr lang="en-US" dirty="0"/>
           </a:p>
@@ -14439,7 +14316,7 @@
           <a:p>
             <a:pPr marL="398463" defTabSz="914099" eaLnBrk="0" hangingPunct="0"/>
             <a:r>
-              <a:rPr lang="en-US" sz="400" smtClean="0">
+              <a:rPr lang="en-US" sz="400">
                 <a:gradFill>
                   <a:gsLst>
                     <a:gs pos="0">
@@ -14493,7 +14370,7 @@
           <a:p>
             <a:fld id="{196BB360-4395-422C-A729-CB974B278917}" type="datetime8">
               <a:rPr lang="en-US" smtClean="0"/>
-              <a:t>12/4/2017 11:07 PM</a:t>
+              <a:t>1/31/2018 4:31 PM</a:t>
             </a:fld>
             <a:endParaRPr lang="en-US" dirty="0"/>
           </a:p>
@@ -14643,7 +14520,7 @@
                   <a:prstClr val="black"/>
                 </a:solidFill>
               </a:rPr>
-              <a:t>12/4/2017 11:07 PM</a:t>
+              <a:t>1/31/2018 4:31 PM</a:t>
             </a:fld>
             <a:endParaRPr lang="en-US" dirty="0">
               <a:solidFill>
@@ -14820,7 +14697,7 @@
           <a:p>
             <a:pPr marL="398463" defTabSz="914099" eaLnBrk="0" hangingPunct="0"/>
             <a:r>
-              <a:rPr lang="en-US" sz="400" smtClean="0">
+              <a:rPr lang="en-US" sz="400">
                 <a:gradFill>
                   <a:gsLst>
                     <a:gs pos="0">
@@ -14874,7 +14751,7 @@
           <a:p>
             <a:fld id="{196BB360-4395-422C-A729-CB974B278917}" type="datetime8">
               <a:rPr lang="en-US" smtClean="0"/>
-              <a:t>12/4/2017 11:07 PM</a:t>
+              <a:t>1/31/2018 4:31 PM</a:t>
             </a:fld>
             <a:endParaRPr lang="en-US" dirty="0"/>
           </a:p>
@@ -15001,7 +14878,7 @@
           <a:p>
             <a:pPr marL="398463" defTabSz="914099" eaLnBrk="0" hangingPunct="0"/>
             <a:r>
-              <a:rPr lang="en-US" sz="400" smtClean="0">
+              <a:rPr lang="en-US" sz="400">
                 <a:gradFill>
                   <a:gsLst>
                     <a:gs pos="0">
@@ -15055,7 +14932,7 @@
           <a:p>
             <a:fld id="{196BB360-4395-422C-A729-CB974B278917}" type="datetime8">
               <a:rPr lang="en-US" smtClean="0"/>
-              <a:t>12/4/2017 11:07 PM</a:t>
+              <a:t>1/31/2018 4:31 PM</a:t>
             </a:fld>
             <a:endParaRPr lang="en-US" dirty="0"/>
           </a:p>
@@ -15182,7 +15059,7 @@
           <a:p>
             <a:pPr marL="398463" defTabSz="914099" eaLnBrk="0" hangingPunct="0"/>
             <a:r>
-              <a:rPr lang="en-US" sz="400" smtClean="0">
+              <a:rPr lang="en-US" sz="400">
                 <a:gradFill>
                   <a:gsLst>
                     <a:gs pos="0">
@@ -15236,7 +15113,7 @@
           <a:p>
             <a:fld id="{196BB360-4395-422C-A729-CB974B278917}" type="datetime8">
               <a:rPr lang="en-US" smtClean="0"/>
-              <a:t>12/4/2017 11:07 PM</a:t>
+              <a:t>1/31/2018 4:31 PM</a:t>
             </a:fld>
             <a:endParaRPr lang="en-US" dirty="0"/>
           </a:p>
@@ -15404,7 +15281,7 @@
           <a:p>
             <a:fld id="{196BB360-4395-422C-A729-CB974B278917}" type="datetime8">
               <a:rPr lang="en-US" smtClean="0"/>
-              <a:t>12/4/2017 11:07 PM</a:t>
+              <a:t>1/31/2018 4:31 PM</a:t>
             </a:fld>
             <a:endParaRPr lang="en-US" dirty="0"/>
           </a:p>
@@ -15531,7 +15408,7 @@
           <a:p>
             <a:pPr marL="398463" defTabSz="914099" eaLnBrk="0" hangingPunct="0"/>
             <a:r>
-              <a:rPr lang="en-US" sz="400" smtClean="0">
+              <a:rPr lang="en-US" sz="400">
                 <a:gradFill>
                   <a:gsLst>
                     <a:gs pos="0">
@@ -15585,7 +15462,7 @@
           <a:p>
             <a:fld id="{196BB360-4395-422C-A729-CB974B278917}" type="datetime8">
               <a:rPr lang="en-US" smtClean="0"/>
-              <a:t>12/4/2017 11:07 PM</a:t>
+              <a:t>1/31/2018 4:31 PM</a:t>
             </a:fld>
             <a:endParaRPr lang="en-US" dirty="0"/>
           </a:p>
@@ -15712,7 +15589,7 @@
           <a:p>
             <a:pPr marL="398463" defTabSz="914099" eaLnBrk="0" hangingPunct="0"/>
             <a:r>
-              <a:rPr lang="en-US" sz="400" smtClean="0">
+              <a:rPr lang="en-US" sz="400">
                 <a:gradFill>
                   <a:gsLst>
                     <a:gs pos="0">
@@ -15766,7 +15643,7 @@
           <a:p>
             <a:fld id="{196BB360-4395-422C-A729-CB974B278917}" type="datetime8">
               <a:rPr lang="en-US" smtClean="0"/>
-              <a:t>12/4/2017 11:07 PM</a:t>
+              <a:t>1/31/2018 4:31 PM</a:t>
             </a:fld>
             <a:endParaRPr lang="en-US" dirty="0"/>
           </a:p>
@@ -15893,7 +15770,7 @@
           <a:p>
             <a:pPr marL="398463" defTabSz="914099" eaLnBrk="0" hangingPunct="0"/>
             <a:r>
-              <a:rPr lang="en-US" sz="400" smtClean="0">
+              <a:rPr lang="en-US" sz="400">
                 <a:gradFill>
                   <a:gsLst>
                     <a:gs pos="0">
@@ -15947,7 +15824,7 @@
           <a:p>
             <a:fld id="{196BB360-4395-422C-A729-CB974B278917}" type="datetime8">
               <a:rPr lang="en-US" smtClean="0"/>
-              <a:t>12/4/2017 11:07 PM</a:t>
+              <a:t>1/31/2018 4:31 PM</a:t>
             </a:fld>
             <a:endParaRPr lang="en-US" dirty="0"/>
           </a:p>
@@ -44721,51 +44598,33 @@
             </a:r>
             <a:r>
               <a:rPr lang="en-US"/>
-              <a:t>30 </a:t>
-            </a:r>
-            <a:r>
-              <a:rPr lang="en-US" smtClean="0"/>
-              <a:t>days</a:t>
+              <a:t>30 days</a:t>
             </a:r>
             <a:endParaRPr lang="en-US" dirty="0"/>
           </a:p>
           <a:p>
             <a:r>
               <a:rPr lang="en-US" dirty="0"/>
-              <a:t>Activity log entries are stored for 90 </a:t>
+              <a:t>Activity log entries are stored for 90 days</a:t>
             </a:r>
-            <a:r>
-              <a:rPr lang="en-US" dirty="0" smtClean="0"/>
-              <a:t>days</a:t>
-            </a:r>
-            <a:endParaRPr lang="en-US" dirty="0"/>
           </a:p>
           <a:p>
             <a:r>
               <a:rPr lang="en-US" dirty="0"/>
-              <a:t>Diagnostics logs are not </a:t>
-            </a:r>
-            <a:r>
-              <a:rPr lang="en-US" dirty="0" smtClean="0"/>
-              <a:t>stored</a:t>
+              <a:t>Diagnostics logs are not stored</a:t>
             </a:r>
           </a:p>
           <a:p>
             <a:pPr lvl="1"/>
             <a:r>
-              <a:rPr lang="en-US" dirty="0" smtClean="0"/>
+              <a:rPr lang="en-US" dirty="0"/>
               <a:t>Use a storage account for longer retention (pricing separate)</a:t>
             </a:r>
-            <a:endParaRPr lang="en-US" dirty="0"/>
-          </a:p>
-          <a:p>
-            <a:r>
-              <a:rPr lang="en-US" dirty="0" smtClean="0"/>
-              <a:t>Consume </a:t>
-            </a:r>
+          </a:p>
+          <a:p>
             <a:r>
               <a:rPr lang="en-US" dirty="0"/>
-              <a:t>via Portal or REST API</a:t>
+              <a:t>Consume via Portal or REST API</a:t>
             </a:r>
           </a:p>
           <a:p>
@@ -44811,13 +44670,6 @@
   <p:transition>
     <p:fade/>
   </p:transition>
-  <p:timing>
-    <p:tnLst>
-      <p:par>
-        <p:cTn id="1" dur="indefinite" restart="never" nodeType="tmRoot"/>
-      </p:par>
-    </p:tnLst>
-  </p:timing>
 </p:sld>
 </file>
 
@@ -44918,13 +44770,6 @@
   <p:transition>
     <p:fade/>
   </p:transition>
-  <p:timing>
-    <p:tnLst>
-      <p:par>
-        <p:cTn id="1" dur="indefinite" restart="never" nodeType="tmRoot"/>
-      </p:par>
-    </p:tnLst>
-  </p:timing>
 </p:sld>
 </file>
 
@@ -47390,10 +47235,6 @@
             <a:br>
               <a:rPr lang="en-US" dirty="0"/>
             </a:br>
-            <a:r>
-              <a:rPr lang="en-US" dirty="0"/>
-              <a:t/>
-            </a:r>
             <a:br>
               <a:rPr lang="en-US" dirty="0"/>
             </a:br>
@@ -48957,7 +48798,7 @@
 </file>
 
 <file path=ppt/slides/slide24.xml><?xml version="1.0" encoding="utf-8"?>
-<p:sld xmlns:a="http://schemas.openxmlformats.org/drawingml/2006/main" xmlns:r="http://schemas.openxmlformats.org/officeDocument/2006/relationships" xmlns:p="http://schemas.openxmlformats.org/presentationml/2006/main">
+<p:sld xmlns:a="http://schemas.openxmlformats.org/drawingml/2006/main" xmlns:r="http://schemas.openxmlformats.org/officeDocument/2006/relationships" xmlns:p="http://schemas.openxmlformats.org/presentationml/2006/main" show="0">
   <p:cSld>
     <p:spTree>
       <p:nvGrpSpPr>
@@ -49027,13 +48868,13 @@
   <p:clrMapOvr>
     <a:masterClrMapping/>
   </p:clrMapOvr>
-  <mc:AlternateContent xmlns:mc="http://schemas.openxmlformats.org/markup-compatibility/2006" xmlns:p14="http://schemas.microsoft.com/office/powerpoint/2010/main">
-    <mc:Choice Requires="p14">
+  <mc:AlternateContent xmlns:mc="http://schemas.openxmlformats.org/markup-compatibility/2006">
+    <mc:Choice xmlns:p14="http://schemas.microsoft.com/office/powerpoint/2010/main" Requires="p14">
       <p:transition spd="slow" p14:dur="3400">
         <p14:reveal/>
       </p:transition>
     </mc:Choice>
-    <mc:Fallback xmlns="">
+    <mc:Fallback>
       <p:transition spd="slow">
         <p:fade/>
       </p:transition>
@@ -52842,7 +52683,7 @@
 </file>
 
 <file path=ppt/slides/slide33.xml><?xml version="1.0" encoding="utf-8"?>
-<p:sld xmlns:a="http://schemas.openxmlformats.org/drawingml/2006/main" xmlns:r="http://schemas.openxmlformats.org/officeDocument/2006/relationships" xmlns:p="http://schemas.openxmlformats.org/presentationml/2006/main">
+<p:sld xmlns:a="http://schemas.openxmlformats.org/drawingml/2006/main" xmlns:r="http://schemas.openxmlformats.org/officeDocument/2006/relationships" xmlns:p="http://schemas.openxmlformats.org/presentationml/2006/main" show="0">
   <p:cSld>
     <p:spTree>
       <p:nvGrpSpPr>
@@ -52912,13 +52753,13 @@
   <p:clrMapOvr>
     <a:masterClrMapping/>
   </p:clrMapOvr>
-  <mc:AlternateContent xmlns:mc="http://schemas.openxmlformats.org/markup-compatibility/2006" xmlns:p14="http://schemas.microsoft.com/office/powerpoint/2010/main">
-    <mc:Choice Requires="p14">
+  <mc:AlternateContent xmlns:mc="http://schemas.openxmlformats.org/markup-compatibility/2006">
+    <mc:Choice xmlns:p14="http://schemas.microsoft.com/office/powerpoint/2010/main" Requires="p14">
       <p:transition spd="slow" p14:dur="3400">
         <p14:reveal/>
       </p:transition>
     </mc:Choice>
-    <mc:Fallback xmlns="">
+    <mc:Fallback>
       <p:transition spd="slow">
         <p:fade/>
       </p:transition>
@@ -53269,7 +53110,12 @@
             <p:ph type="body" sz="quarter" idx="10"/>
           </p:nvPr>
         </p:nvSpPr>
-        <p:spPr/>
+        <p:spPr>
+          <a:xfrm>
+            <a:off x="274638" y="1212850"/>
+            <a:ext cx="11887200" cy="4949047"/>
+          </a:xfrm>
+        </p:spPr>
         <p:txBody>
           <a:bodyPr/>
           <a:lstStyle/>
@@ -53294,6 +53140,18 @@
           <a:p>
             <a:r>
               <a:rPr lang="en-US" dirty="0"/>
+              <a:t>What is the root cause?</a:t>
+            </a:r>
+          </a:p>
+          <a:p>
+            <a:r>
+              <a:rPr lang="en-US" dirty="0"/>
+              <a:t>How many people are impacted?</a:t>
+            </a:r>
+          </a:p>
+          <a:p>
+            <a:r>
+              <a:rPr lang="en-US" dirty="0"/>
               <a:t>Is my application fast enough? </a:t>
             </a:r>
           </a:p>
@@ -53306,19 +53164,7 @@
           <a:p>
             <a:r>
               <a:rPr lang="en-US" dirty="0"/>
-              <a:t>What is the root cause?</a:t>
-            </a:r>
-          </a:p>
-          <a:p>
-            <a:r>
-              <a:rPr lang="en-US" dirty="0"/>
               <a:t>Am I meeting my SLA?</a:t>
-            </a:r>
-          </a:p>
-          <a:p>
-            <a:r>
-              <a:rPr lang="en-US" dirty="0"/>
-              <a:t>How many people are impacted?</a:t>
             </a:r>
           </a:p>
         </p:txBody>
@@ -58819,21 +58665,6 @@
 </file>
 
 <file path=customXml/item1.xml><?xml version="1.0" encoding="utf-8"?>
-<p:properties xmlns:p="http://schemas.microsoft.com/office/2006/metadata/properties" xmlns:xsi="http://www.w3.org/2001/XMLSchema-instance" xmlns:pc="http://schemas.microsoft.com/office/infopath/2007/PartnerControls">
-  <documentManagement/>
-</p:properties>
-</file>
-
-<file path=customXml/item2.xml><?xml version="1.0" encoding="utf-8"?>
-<?mso-contentType ?>
-<FormTemplates xmlns="http://schemas.microsoft.com/sharepoint/v3/contenttype/forms">
-  <Display>DocumentLibraryForm</Display>
-  <Edit>DocumentLibraryForm</Edit>
-  <New>DocumentLibraryForm</New>
-</FormTemplates>
-</file>
-
-<file path=customXml/item3.xml><?xml version="1.0" encoding="utf-8"?>
 <ct:contentTypeSchema xmlns:ct="http://schemas.microsoft.com/office/2006/metadata/contentType" xmlns:ma="http://schemas.microsoft.com/office/2006/metadata/properties/metaAttributes" ct:_="" ma:_="" ma:contentTypeName="Document" ma:contentTypeID="0x010100A2B0BB5962AB3C45A9A1CE1EC4C4F647" ma:contentTypeVersion="3" ma:contentTypeDescription="Create a new document." ma:contentTypeScope="" ma:versionID="f0876370c90de824ab54c09b0bd2a056">
   <xsd:schema xmlns:xsd="http://www.w3.org/2001/XMLSchema" xmlns:xs="http://www.w3.org/2001/XMLSchema" xmlns:p="http://schemas.microsoft.com/office/2006/metadata/properties" xmlns:ns3="630a2e83-186a-4a0f-ab27-bee8a8096abc" targetNamespace="http://schemas.microsoft.com/office/2006/metadata/properties" ma:root="true" ma:fieldsID="a2a3b5ed8b4accd7c8a398d0cb075271" ns3:_="">
     <xsd:import namespace="630a2e83-186a-4a0f-ab27-bee8a8096abc"/>
@@ -58987,31 +58818,22 @@
 </ct:contentTypeSchema>
 </file>
 
-<file path=customXml/itemProps1.xml><?xml version="1.0" encoding="utf-8"?>
-<ds:datastoreItem xmlns:ds="http://schemas.openxmlformats.org/officeDocument/2006/customXml" ds:itemID="{F990F116-B58F-4255-B05B-DA3808E0E5C6}">
-  <ds:schemaRefs>
-    <ds:schemaRef ds:uri="http://schemas.microsoft.com/office/2006/metadata/properties"/>
-    <ds:schemaRef ds:uri="http://purl.org/dc/terms/"/>
-    <ds:schemaRef ds:uri="http://schemas.openxmlformats.org/package/2006/metadata/core-properties"/>
-    <ds:schemaRef ds:uri="630a2e83-186a-4a0f-ab27-bee8a8096abc"/>
-    <ds:schemaRef ds:uri="http://schemas.microsoft.com/office/2006/documentManagement/types"/>
-    <ds:schemaRef ds:uri="http://schemas.microsoft.com/office/infopath/2007/PartnerControls"/>
-    <ds:schemaRef ds:uri="http://purl.org/dc/elements/1.1/"/>
-    <ds:schemaRef ds:uri="http://www.w3.org/XML/1998/namespace"/>
-    <ds:schemaRef ds:uri="http://purl.org/dc/dcmitype/"/>
-  </ds:schemaRefs>
-</ds:datastoreItem>
+<file path=customXml/item2.xml><?xml version="1.0" encoding="utf-8"?>
+<?mso-contentType ?>
+<FormTemplates xmlns="http://schemas.microsoft.com/sharepoint/v3/contenttype/forms">
+  <Display>DocumentLibraryForm</Display>
+  <Edit>DocumentLibraryForm</Edit>
+  <New>DocumentLibraryForm</New>
+</FormTemplates>
 </file>
 
-<file path=customXml/itemProps2.xml><?xml version="1.0" encoding="utf-8"?>
-<ds:datastoreItem xmlns:ds="http://schemas.openxmlformats.org/officeDocument/2006/customXml" ds:itemID="{758FDAC0-319D-4A54-8D8E-1D42CB1F8004}">
-  <ds:schemaRefs>
-    <ds:schemaRef ds:uri="http://schemas.microsoft.com/sharepoint/v3/contenttype/forms"/>
-  </ds:schemaRefs>
-</ds:datastoreItem>
+<file path=customXml/item3.xml><?xml version="1.0" encoding="utf-8"?>
+<p:properties xmlns:p="http://schemas.microsoft.com/office/2006/metadata/properties" xmlns:xsi="http://www.w3.org/2001/XMLSchema-instance" xmlns:pc="http://schemas.microsoft.com/office/infopath/2007/PartnerControls">
+  <documentManagement/>
+</p:properties>
 </file>
 
-<file path=customXml/itemProps3.xml><?xml version="1.0" encoding="utf-8"?>
+<file path=customXml/itemProps1.xml><?xml version="1.0" encoding="utf-8"?>
 <ds:datastoreItem xmlns:ds="http://schemas.openxmlformats.org/officeDocument/2006/customXml" ds:itemID="{F4553072-E538-48C4-90FC-3653F32D67C5}">
   <ds:schemaRefs>
     <ds:schemaRef ds:uri="http://schemas.microsoft.com/office/2006/metadata/contentType"/>
@@ -59027,4 +58849,28 @@
     <ds:schemaRef ds:uri="http://schemas.microsoft.com/internal/obd"/>
   </ds:schemaRefs>
 </ds:datastoreItem>
+</file>
+
+<file path=customXml/itemProps2.xml><?xml version="1.0" encoding="utf-8"?>
+<ds:datastoreItem xmlns:ds="http://schemas.openxmlformats.org/officeDocument/2006/customXml" ds:itemID="{758FDAC0-319D-4A54-8D8E-1D42CB1F8004}">
+  <ds:schemaRefs>
+    <ds:schemaRef ds:uri="http://schemas.microsoft.com/sharepoint/v3/contenttype/forms"/>
+  </ds:schemaRefs>
+</ds:datastoreItem>
+</file>
+
+<file path=customXml/itemProps3.xml><?xml version="1.0" encoding="utf-8"?>
+<ds:datastoreItem xmlns:ds="http://schemas.openxmlformats.org/officeDocument/2006/customXml" ds:itemID="{F990F116-B58F-4255-B05B-DA3808E0E5C6}">
+  <ds:schemaRefs>
+    <ds:schemaRef ds:uri="http://schemas.microsoft.com/office/2006/metadata/properties"/>
+    <ds:schemaRef ds:uri="http://purl.org/dc/terms/"/>
+    <ds:schemaRef ds:uri="http://schemas.openxmlformats.org/package/2006/metadata/core-properties"/>
+    <ds:schemaRef ds:uri="630a2e83-186a-4a0f-ab27-bee8a8096abc"/>
+    <ds:schemaRef ds:uri="http://schemas.microsoft.com/office/2006/documentManagement/types"/>
+    <ds:schemaRef ds:uri="http://schemas.microsoft.com/office/infopath/2007/PartnerControls"/>
+    <ds:schemaRef ds:uri="http://purl.org/dc/elements/1.1/"/>
+    <ds:schemaRef ds:uri="http://www.w3.org/XML/1998/namespace"/>
+    <ds:schemaRef ds:uri="http://purl.org/dc/dcmitype/"/>
+  </ds:schemaRefs>
+</ds:datastoreItem>
 </file>
</xml_diff>